<commit_message>
Corrections: Updated MultiAPR diagram
with measures, noise source
</commit_message>
<xml_diff>
--- a/Chapter4_MultiAPR/Chapter4Figs/MultiAPRsystem.pptx
+++ b/Chapter4_MultiAPR/Chapter4Figs/MultiAPRsystem.pptx
@@ -104,6 +104,22 @@
       </a:defRPr>
     </a:lvl9pPr>
   </p:defaultTextStyle>
+  <p:extLst>
+    <p:ext uri="{EFAFB233-063F-42B5-8137-9DF3F51BA10A}">
+      <p15:sldGuideLst xmlns:p15="http://schemas.microsoft.com/office/powerpoint/2012/main">
+        <p15:guide id="1" orient="horz" pos="2160">
+          <p15:clr>
+            <a:srgbClr val="A4A3A4"/>
+          </p15:clr>
+        </p15:guide>
+        <p15:guide id="2" pos="2880">
+          <p15:clr>
+            <a:srgbClr val="A4A3A4"/>
+          </p15:clr>
+        </p15:guide>
+      </p15:sldGuideLst>
+    </p:ext>
+  </p:extLst>
 </p:presentation>
 </file>
 
@@ -289,7 +305,7 @@
             <a:fld id="{F37EC879-F91F-49E7-AEEA-B7186FD45F89}" type="datetimeFigureOut">
               <a:rPr lang="en-GB" smtClean="0"/>
               <a:pPr/>
-              <a:t>04/11/2013</a:t>
+              <a:t>21/09/2014</a:t>
             </a:fld>
             <a:endParaRPr lang="en-GB"/>
           </a:p>
@@ -456,7 +472,7 @@
             <a:fld id="{F37EC879-F91F-49E7-AEEA-B7186FD45F89}" type="datetimeFigureOut">
               <a:rPr lang="en-GB" smtClean="0"/>
               <a:pPr/>
-              <a:t>04/11/2013</a:t>
+              <a:t>21/09/2014</a:t>
             </a:fld>
             <a:endParaRPr lang="en-GB"/>
           </a:p>
@@ -633,7 +649,7 @@
             <a:fld id="{F37EC879-F91F-49E7-AEEA-B7186FD45F89}" type="datetimeFigureOut">
               <a:rPr lang="en-GB" smtClean="0"/>
               <a:pPr/>
-              <a:t>04/11/2013</a:t>
+              <a:t>21/09/2014</a:t>
             </a:fld>
             <a:endParaRPr lang="en-GB"/>
           </a:p>
@@ -800,7 +816,7 @@
             <a:fld id="{F37EC879-F91F-49E7-AEEA-B7186FD45F89}" type="datetimeFigureOut">
               <a:rPr lang="en-GB" smtClean="0"/>
               <a:pPr/>
-              <a:t>04/11/2013</a:t>
+              <a:t>21/09/2014</a:t>
             </a:fld>
             <a:endParaRPr lang="en-GB"/>
           </a:p>
@@ -1043,7 +1059,7 @@
             <a:fld id="{F37EC879-F91F-49E7-AEEA-B7186FD45F89}" type="datetimeFigureOut">
               <a:rPr lang="en-GB" smtClean="0"/>
               <a:pPr/>
-              <a:t>04/11/2013</a:t>
+              <a:t>21/09/2014</a:t>
             </a:fld>
             <a:endParaRPr lang="en-GB"/>
           </a:p>
@@ -1328,7 +1344,7 @@
             <a:fld id="{F37EC879-F91F-49E7-AEEA-B7186FD45F89}" type="datetimeFigureOut">
               <a:rPr lang="en-GB" smtClean="0"/>
               <a:pPr/>
-              <a:t>04/11/2013</a:t>
+              <a:t>21/09/2014</a:t>
             </a:fld>
             <a:endParaRPr lang="en-GB"/>
           </a:p>
@@ -1747,7 +1763,7 @@
             <a:fld id="{F37EC879-F91F-49E7-AEEA-B7186FD45F89}" type="datetimeFigureOut">
               <a:rPr lang="en-GB" smtClean="0"/>
               <a:pPr/>
-              <a:t>04/11/2013</a:t>
+              <a:t>21/09/2014</a:t>
             </a:fld>
             <a:endParaRPr lang="en-GB"/>
           </a:p>
@@ -1862,7 +1878,7 @@
             <a:fld id="{F37EC879-F91F-49E7-AEEA-B7186FD45F89}" type="datetimeFigureOut">
               <a:rPr lang="en-GB" smtClean="0"/>
               <a:pPr/>
-              <a:t>04/11/2013</a:t>
+              <a:t>21/09/2014</a:t>
             </a:fld>
             <a:endParaRPr lang="en-GB"/>
           </a:p>
@@ -1954,7 +1970,7 @@
             <a:fld id="{F37EC879-F91F-49E7-AEEA-B7186FD45F89}" type="datetimeFigureOut">
               <a:rPr lang="en-GB" smtClean="0"/>
               <a:pPr/>
-              <a:t>04/11/2013</a:t>
+              <a:t>21/09/2014</a:t>
             </a:fld>
             <a:endParaRPr lang="en-GB"/>
           </a:p>
@@ -2228,7 +2244,7 @@
             <a:fld id="{F37EC879-F91F-49E7-AEEA-B7186FD45F89}" type="datetimeFigureOut">
               <a:rPr lang="en-GB" smtClean="0"/>
               <a:pPr/>
-              <a:t>04/11/2013</a:t>
+              <a:t>21/09/2014</a:t>
             </a:fld>
             <a:endParaRPr lang="en-GB"/>
           </a:p>
@@ -2478,7 +2494,7 @@
             <a:fld id="{F37EC879-F91F-49E7-AEEA-B7186FD45F89}" type="datetimeFigureOut">
               <a:rPr lang="en-GB" smtClean="0"/>
               <a:pPr/>
-              <a:t>04/11/2013</a:t>
+              <a:t>21/09/2014</a:t>
             </a:fld>
             <a:endParaRPr lang="en-GB"/>
           </a:p>
@@ -2688,7 +2704,7 @@
             <a:fld id="{F37EC879-F91F-49E7-AEEA-B7186FD45F89}" type="datetimeFigureOut">
               <a:rPr lang="en-GB" smtClean="0"/>
               <a:pPr/>
-              <a:t>04/11/2013</a:t>
+              <a:t>21/09/2014</a:t>
             </a:fld>
             <a:endParaRPr lang="en-GB"/>
           </a:p>
@@ -3059,18 +3075,2505 @@
           <a:chExt cx="0" cy="0"/>
         </a:xfrm>
       </p:grpSpPr>
+      <p:sp>
+        <p:nvSpPr>
+          <p:cNvPr id="5" name="Rounded Rectangle 4"/>
+          <p:cNvSpPr/>
+          <p:nvPr/>
+        </p:nvSpPr>
+        <p:spPr>
+          <a:xfrm>
+            <a:off x="1043608" y="1331619"/>
+            <a:ext cx="2736304" cy="3456384"/>
+          </a:xfrm>
+          <a:prstGeom prst="roundRect">
+            <a:avLst>
+              <a:gd name="adj" fmla="val 2290"/>
+            </a:avLst>
+          </a:prstGeom>
+          <a:noFill/>
+          <a:ln w="38100">
+            <a:solidFill>
+              <a:schemeClr val="tx1"/>
+            </a:solidFill>
+          </a:ln>
+        </p:spPr>
+        <p:style>
+          <a:lnRef idx="2">
+            <a:schemeClr val="accent1">
+              <a:shade val="50000"/>
+            </a:schemeClr>
+          </a:lnRef>
+          <a:fillRef idx="1">
+            <a:schemeClr val="accent1"/>
+          </a:fillRef>
+          <a:effectRef idx="0">
+            <a:schemeClr val="accent1"/>
+          </a:effectRef>
+          <a:fontRef idx="minor">
+            <a:schemeClr val="lt1"/>
+          </a:fontRef>
+        </p:style>
+        <p:txBody>
+          <a:bodyPr rtlCol="0" anchor="ctr"/>
+          <a:lstStyle/>
+          <a:p>
+            <a:pPr algn="ctr"/>
+            <a:endParaRPr lang="en-GB"/>
+          </a:p>
+        </p:txBody>
+      </p:sp>
       <p:grpSp>
         <p:nvGrpSpPr>
-          <p:cNvPr id="37" name="Group 36"/>
+          <p:cNvPr id="13" name="Group 12"/>
           <p:cNvGrpSpPr/>
           <p:nvPr/>
         </p:nvGrpSpPr>
         <p:grpSpPr>
           <a:xfrm>
-            <a:off x="25400" y="50800"/>
-            <a:ext cx="5544616" cy="3816424"/>
-            <a:chOff x="2411760" y="1196752"/>
-            <a:chExt cx="5544616" cy="3816424"/>
+            <a:off x="913127" y="1237902"/>
+            <a:ext cx="274116" cy="218405"/>
+            <a:chOff x="1371328" y="1410395"/>
+            <a:chExt cx="274116" cy="218405"/>
+          </a:xfrm>
+          <a:solidFill>
+            <a:schemeClr val="bg1"/>
+          </a:solidFill>
+        </p:grpSpPr>
+        <p:sp>
+          <p:nvSpPr>
+            <p:cNvPr id="6" name="Oval 5"/>
+            <p:cNvSpPr/>
+            <p:nvPr/>
+          </p:nvSpPr>
+          <p:spPr>
+            <a:xfrm>
+              <a:off x="1403648" y="1412776"/>
+              <a:ext cx="216024" cy="216024"/>
+            </a:xfrm>
+            <a:prstGeom prst="ellipse">
+              <a:avLst/>
+            </a:prstGeom>
+            <a:grpFill/>
+            <a:ln w="38100">
+              <a:solidFill>
+                <a:schemeClr val="tx1"/>
+              </a:solidFill>
+            </a:ln>
+          </p:spPr>
+          <p:style>
+            <a:lnRef idx="2">
+              <a:schemeClr val="accent1">
+                <a:shade val="50000"/>
+              </a:schemeClr>
+            </a:lnRef>
+            <a:fillRef idx="1">
+              <a:schemeClr val="accent1"/>
+            </a:fillRef>
+            <a:effectRef idx="0">
+              <a:schemeClr val="accent1"/>
+            </a:effectRef>
+            <a:fontRef idx="minor">
+              <a:schemeClr val="lt1"/>
+            </a:fontRef>
+          </p:style>
+          <p:txBody>
+            <a:bodyPr rtlCol="0" anchor="ctr"/>
+            <a:lstStyle/>
+            <a:p>
+              <a:pPr algn="ctr"/>
+              <a:endParaRPr lang="en-GB"/>
+            </a:p>
+          </p:txBody>
+        </p:sp>
+        <p:cxnSp>
+          <p:nvCxnSpPr>
+            <p:cNvPr id="8" name="Straight Connector 7"/>
+            <p:cNvCxnSpPr/>
+            <p:nvPr/>
+          </p:nvCxnSpPr>
+          <p:spPr>
+            <a:xfrm>
+              <a:off x="1371328" y="1410395"/>
+              <a:ext cx="274116" cy="1687"/>
+            </a:xfrm>
+            <a:prstGeom prst="line">
+              <a:avLst/>
+            </a:prstGeom>
+            <a:grpFill/>
+            <a:ln w="38100">
+              <a:solidFill>
+                <a:schemeClr val="tx1"/>
+              </a:solidFill>
+            </a:ln>
+          </p:spPr>
+          <p:style>
+            <a:lnRef idx="1">
+              <a:schemeClr val="accent1"/>
+            </a:lnRef>
+            <a:fillRef idx="0">
+              <a:schemeClr val="accent1"/>
+            </a:fillRef>
+            <a:effectRef idx="0">
+              <a:schemeClr val="accent1"/>
+            </a:effectRef>
+            <a:fontRef idx="minor">
+              <a:schemeClr val="tx1"/>
+            </a:fontRef>
+          </p:style>
+        </p:cxnSp>
+      </p:grpSp>
+      <p:grpSp>
+        <p:nvGrpSpPr>
+          <p:cNvPr id="14" name="Group 13"/>
+          <p:cNvGrpSpPr/>
+          <p:nvPr/>
+        </p:nvGrpSpPr>
+        <p:grpSpPr>
+          <a:xfrm>
+            <a:off x="3172868" y="1619651"/>
+            <a:ext cx="274116" cy="218405"/>
+            <a:chOff x="1371328" y="1410395"/>
+            <a:chExt cx="274116" cy="218405"/>
+          </a:xfrm>
+        </p:grpSpPr>
+        <p:sp>
+          <p:nvSpPr>
+            <p:cNvPr id="15" name="Oval 14"/>
+            <p:cNvSpPr/>
+            <p:nvPr/>
+          </p:nvSpPr>
+          <p:spPr>
+            <a:xfrm>
+              <a:off x="1403648" y="1412776"/>
+              <a:ext cx="216024" cy="216024"/>
+            </a:xfrm>
+            <a:prstGeom prst="ellipse">
+              <a:avLst/>
+            </a:prstGeom>
+            <a:noFill/>
+            <a:ln w="38100">
+              <a:solidFill>
+                <a:schemeClr val="tx1"/>
+              </a:solidFill>
+            </a:ln>
+          </p:spPr>
+          <p:style>
+            <a:lnRef idx="2">
+              <a:schemeClr val="accent1">
+                <a:shade val="50000"/>
+              </a:schemeClr>
+            </a:lnRef>
+            <a:fillRef idx="1">
+              <a:schemeClr val="accent1"/>
+            </a:fillRef>
+            <a:effectRef idx="0">
+              <a:schemeClr val="accent1"/>
+            </a:effectRef>
+            <a:fontRef idx="minor">
+              <a:schemeClr val="lt1"/>
+            </a:fontRef>
+          </p:style>
+          <p:txBody>
+            <a:bodyPr rtlCol="0" anchor="ctr"/>
+            <a:lstStyle/>
+            <a:p>
+              <a:pPr algn="ctr"/>
+              <a:endParaRPr lang="en-GB"/>
+            </a:p>
+          </p:txBody>
+        </p:sp>
+        <p:cxnSp>
+          <p:nvCxnSpPr>
+            <p:cNvPr id="16" name="Straight Connector 15"/>
+            <p:cNvCxnSpPr/>
+            <p:nvPr/>
+          </p:nvCxnSpPr>
+          <p:spPr>
+            <a:xfrm>
+              <a:off x="1371328" y="1410395"/>
+              <a:ext cx="274116" cy="1687"/>
+            </a:xfrm>
+            <a:prstGeom prst="line">
+              <a:avLst/>
+            </a:prstGeom>
+            <a:ln w="38100">
+              <a:solidFill>
+                <a:schemeClr val="tx1"/>
+              </a:solidFill>
+            </a:ln>
+          </p:spPr>
+          <p:style>
+            <a:lnRef idx="1">
+              <a:schemeClr val="accent1"/>
+            </a:lnRef>
+            <a:fillRef idx="0">
+              <a:schemeClr val="accent1"/>
+            </a:fillRef>
+            <a:effectRef idx="0">
+              <a:schemeClr val="accent1"/>
+            </a:effectRef>
+            <a:fontRef idx="minor">
+              <a:schemeClr val="tx1"/>
+            </a:fontRef>
+          </p:style>
+        </p:cxnSp>
+      </p:grpSp>
+      <p:grpSp>
+        <p:nvGrpSpPr>
+          <p:cNvPr id="17" name="Group 16"/>
+          <p:cNvGrpSpPr/>
+          <p:nvPr/>
+        </p:nvGrpSpPr>
+        <p:grpSpPr>
+          <a:xfrm>
+            <a:off x="2385472" y="4333095"/>
+            <a:ext cx="274116" cy="218405"/>
+            <a:chOff x="1371328" y="1410395"/>
+            <a:chExt cx="274116" cy="218405"/>
+          </a:xfrm>
+        </p:grpSpPr>
+        <p:sp>
+          <p:nvSpPr>
+            <p:cNvPr id="18" name="Oval 17"/>
+            <p:cNvSpPr/>
+            <p:nvPr/>
+          </p:nvSpPr>
+          <p:spPr>
+            <a:xfrm>
+              <a:off x="1403648" y="1412776"/>
+              <a:ext cx="216024" cy="216024"/>
+            </a:xfrm>
+            <a:prstGeom prst="ellipse">
+              <a:avLst/>
+            </a:prstGeom>
+            <a:noFill/>
+            <a:ln w="38100">
+              <a:solidFill>
+                <a:schemeClr val="tx1"/>
+              </a:solidFill>
+            </a:ln>
+          </p:spPr>
+          <p:style>
+            <a:lnRef idx="2">
+              <a:schemeClr val="accent1">
+                <a:shade val="50000"/>
+              </a:schemeClr>
+            </a:lnRef>
+            <a:fillRef idx="1">
+              <a:schemeClr val="accent1"/>
+            </a:fillRef>
+            <a:effectRef idx="0">
+              <a:schemeClr val="accent1"/>
+            </a:effectRef>
+            <a:fontRef idx="minor">
+              <a:schemeClr val="lt1"/>
+            </a:fontRef>
+          </p:style>
+          <p:txBody>
+            <a:bodyPr rtlCol="0" anchor="ctr"/>
+            <a:lstStyle/>
+            <a:p>
+              <a:pPr algn="ctr"/>
+              <a:endParaRPr lang="en-GB"/>
+            </a:p>
+          </p:txBody>
+        </p:sp>
+        <p:cxnSp>
+          <p:nvCxnSpPr>
+            <p:cNvPr id="19" name="Straight Connector 18"/>
+            <p:cNvCxnSpPr/>
+            <p:nvPr/>
+          </p:nvCxnSpPr>
+          <p:spPr>
+            <a:xfrm>
+              <a:off x="1371328" y="1410395"/>
+              <a:ext cx="274116" cy="1687"/>
+            </a:xfrm>
+            <a:prstGeom prst="line">
+              <a:avLst/>
+            </a:prstGeom>
+            <a:ln w="38100">
+              <a:solidFill>
+                <a:schemeClr val="tx1"/>
+              </a:solidFill>
+            </a:ln>
+          </p:spPr>
+          <p:style>
+            <a:lnRef idx="1">
+              <a:schemeClr val="accent1"/>
+            </a:lnRef>
+            <a:fillRef idx="0">
+              <a:schemeClr val="accent1"/>
+            </a:fillRef>
+            <a:effectRef idx="0">
+              <a:schemeClr val="accent1"/>
+            </a:effectRef>
+            <a:fontRef idx="minor">
+              <a:schemeClr val="tx1"/>
+            </a:fontRef>
+          </p:style>
+        </p:cxnSp>
+      </p:grpSp>
+      <p:sp>
+        <p:nvSpPr>
+          <p:cNvPr id="20" name="Oval 19"/>
+          <p:cNvSpPr/>
+          <p:nvPr/>
+        </p:nvSpPr>
+        <p:spPr>
+          <a:xfrm>
+            <a:off x="1547664" y="2051699"/>
+            <a:ext cx="216024" cy="216024"/>
+          </a:xfrm>
+          <a:prstGeom prst="ellipse">
+            <a:avLst/>
+          </a:prstGeom>
+          <a:solidFill>
+            <a:srgbClr val="FF0000"/>
+          </a:solidFill>
+          <a:ln>
+            <a:noFill/>
+          </a:ln>
+        </p:spPr>
+        <p:style>
+          <a:lnRef idx="2">
+            <a:schemeClr val="accent1">
+              <a:shade val="50000"/>
+            </a:schemeClr>
+          </a:lnRef>
+          <a:fillRef idx="1">
+            <a:schemeClr val="accent1"/>
+          </a:fillRef>
+          <a:effectRef idx="0">
+            <a:schemeClr val="accent1"/>
+          </a:effectRef>
+          <a:fontRef idx="minor">
+            <a:schemeClr val="lt1"/>
+          </a:fontRef>
+        </p:style>
+        <p:txBody>
+          <a:bodyPr rtlCol="0" anchor="ctr"/>
+          <a:lstStyle/>
+          <a:p>
+            <a:pPr algn="ctr"/>
+            <a:endParaRPr lang="en-GB"/>
+          </a:p>
+        </p:txBody>
+      </p:sp>
+      <p:sp>
+        <p:nvSpPr>
+          <p:cNvPr id="21" name="Oval 20"/>
+          <p:cNvSpPr/>
+          <p:nvPr/>
+        </p:nvSpPr>
+        <p:spPr>
+          <a:xfrm>
+            <a:off x="2411760" y="2051699"/>
+            <a:ext cx="216024" cy="216024"/>
+          </a:xfrm>
+          <a:prstGeom prst="ellipse">
+            <a:avLst/>
+          </a:prstGeom>
+          <a:solidFill>
+            <a:srgbClr val="FF0000"/>
+          </a:solidFill>
+          <a:ln>
+            <a:noFill/>
+          </a:ln>
+        </p:spPr>
+        <p:style>
+          <a:lnRef idx="2">
+            <a:schemeClr val="accent1">
+              <a:shade val="50000"/>
+            </a:schemeClr>
+          </a:lnRef>
+          <a:fillRef idx="1">
+            <a:schemeClr val="accent1"/>
+          </a:fillRef>
+          <a:effectRef idx="0">
+            <a:schemeClr val="accent1"/>
+          </a:effectRef>
+          <a:fontRef idx="minor">
+            <a:schemeClr val="lt1"/>
+          </a:fontRef>
+        </p:style>
+        <p:txBody>
+          <a:bodyPr rtlCol="0" anchor="ctr"/>
+          <a:lstStyle/>
+          <a:p>
+            <a:pPr algn="ctr"/>
+            <a:endParaRPr lang="en-GB"/>
+          </a:p>
+        </p:txBody>
+      </p:sp>
+      <p:sp>
+        <p:nvSpPr>
+          <p:cNvPr id="22" name="Oval 21"/>
+          <p:cNvSpPr/>
+          <p:nvPr/>
+        </p:nvSpPr>
+        <p:spPr>
+          <a:xfrm>
+            <a:off x="3275856" y="2051699"/>
+            <a:ext cx="216024" cy="216024"/>
+          </a:xfrm>
+          <a:prstGeom prst="ellipse">
+            <a:avLst/>
+          </a:prstGeom>
+          <a:solidFill>
+            <a:srgbClr val="FF0000"/>
+          </a:solidFill>
+          <a:ln>
+            <a:noFill/>
+          </a:ln>
+        </p:spPr>
+        <p:style>
+          <a:lnRef idx="2">
+            <a:schemeClr val="accent1">
+              <a:shade val="50000"/>
+            </a:schemeClr>
+          </a:lnRef>
+          <a:fillRef idx="1">
+            <a:schemeClr val="accent1"/>
+          </a:fillRef>
+          <a:effectRef idx="0">
+            <a:schemeClr val="accent1"/>
+          </a:effectRef>
+          <a:fontRef idx="minor">
+            <a:schemeClr val="lt1"/>
+          </a:fontRef>
+        </p:style>
+        <p:txBody>
+          <a:bodyPr rtlCol="0" anchor="ctr"/>
+          <a:lstStyle/>
+          <a:p>
+            <a:pPr algn="ctr"/>
+            <a:endParaRPr lang="en-GB"/>
+          </a:p>
+        </p:txBody>
+      </p:sp>
+      <p:sp>
+        <p:nvSpPr>
+          <p:cNvPr id="23" name="Oval 22"/>
+          <p:cNvSpPr/>
+          <p:nvPr/>
+        </p:nvSpPr>
+        <p:spPr>
+          <a:xfrm>
+            <a:off x="1547664" y="2915795"/>
+            <a:ext cx="216024" cy="216024"/>
+          </a:xfrm>
+          <a:prstGeom prst="ellipse">
+            <a:avLst/>
+          </a:prstGeom>
+          <a:solidFill>
+            <a:srgbClr val="FF0000"/>
+          </a:solidFill>
+          <a:ln>
+            <a:noFill/>
+          </a:ln>
+        </p:spPr>
+        <p:style>
+          <a:lnRef idx="2">
+            <a:schemeClr val="accent1">
+              <a:shade val="50000"/>
+            </a:schemeClr>
+          </a:lnRef>
+          <a:fillRef idx="1">
+            <a:schemeClr val="accent1"/>
+          </a:fillRef>
+          <a:effectRef idx="0">
+            <a:schemeClr val="accent1"/>
+          </a:effectRef>
+          <a:fontRef idx="minor">
+            <a:schemeClr val="lt1"/>
+          </a:fontRef>
+        </p:style>
+        <p:txBody>
+          <a:bodyPr rtlCol="0" anchor="ctr"/>
+          <a:lstStyle/>
+          <a:p>
+            <a:pPr algn="ctr"/>
+            <a:endParaRPr lang="en-GB"/>
+          </a:p>
+        </p:txBody>
+      </p:sp>
+      <p:sp>
+        <p:nvSpPr>
+          <p:cNvPr id="24" name="Oval 23"/>
+          <p:cNvSpPr/>
+          <p:nvPr/>
+        </p:nvSpPr>
+        <p:spPr>
+          <a:xfrm>
+            <a:off x="2411760" y="2915795"/>
+            <a:ext cx="216024" cy="216024"/>
+          </a:xfrm>
+          <a:prstGeom prst="ellipse">
+            <a:avLst/>
+          </a:prstGeom>
+          <a:solidFill>
+            <a:srgbClr val="FF0000"/>
+          </a:solidFill>
+          <a:ln>
+            <a:noFill/>
+          </a:ln>
+        </p:spPr>
+        <p:style>
+          <a:lnRef idx="2">
+            <a:schemeClr val="accent1">
+              <a:shade val="50000"/>
+            </a:schemeClr>
+          </a:lnRef>
+          <a:fillRef idx="1">
+            <a:schemeClr val="accent1"/>
+          </a:fillRef>
+          <a:effectRef idx="0">
+            <a:schemeClr val="accent1"/>
+          </a:effectRef>
+          <a:fontRef idx="minor">
+            <a:schemeClr val="lt1"/>
+          </a:fontRef>
+        </p:style>
+        <p:txBody>
+          <a:bodyPr rtlCol="0" anchor="ctr"/>
+          <a:lstStyle/>
+          <a:p>
+            <a:pPr algn="ctr"/>
+            <a:endParaRPr lang="en-GB"/>
+          </a:p>
+        </p:txBody>
+      </p:sp>
+      <p:sp>
+        <p:nvSpPr>
+          <p:cNvPr id="25" name="Oval 24"/>
+          <p:cNvSpPr/>
+          <p:nvPr/>
+        </p:nvSpPr>
+        <p:spPr>
+          <a:xfrm>
+            <a:off x="3275856" y="2915795"/>
+            <a:ext cx="216024" cy="216024"/>
+          </a:xfrm>
+          <a:prstGeom prst="ellipse">
+            <a:avLst/>
+          </a:prstGeom>
+          <a:solidFill>
+            <a:srgbClr val="FF0000"/>
+          </a:solidFill>
+          <a:ln>
+            <a:noFill/>
+          </a:ln>
+        </p:spPr>
+        <p:style>
+          <a:lnRef idx="2">
+            <a:schemeClr val="accent1">
+              <a:shade val="50000"/>
+            </a:schemeClr>
+          </a:lnRef>
+          <a:fillRef idx="1">
+            <a:schemeClr val="accent1"/>
+          </a:fillRef>
+          <a:effectRef idx="0">
+            <a:schemeClr val="accent1"/>
+          </a:effectRef>
+          <a:fontRef idx="minor">
+            <a:schemeClr val="lt1"/>
+          </a:fontRef>
+        </p:style>
+        <p:txBody>
+          <a:bodyPr rtlCol="0" anchor="ctr"/>
+          <a:lstStyle/>
+          <a:p>
+            <a:pPr algn="ctr"/>
+            <a:endParaRPr lang="en-GB"/>
+          </a:p>
+        </p:txBody>
+      </p:sp>
+      <p:sp>
+        <p:nvSpPr>
+          <p:cNvPr id="27" name="Oval 26"/>
+          <p:cNvSpPr/>
+          <p:nvPr/>
+        </p:nvSpPr>
+        <p:spPr>
+          <a:xfrm>
+            <a:off x="1547664" y="3779891"/>
+            <a:ext cx="216024" cy="216024"/>
+          </a:xfrm>
+          <a:prstGeom prst="ellipse">
+            <a:avLst/>
+          </a:prstGeom>
+          <a:solidFill>
+            <a:srgbClr val="FF0000"/>
+          </a:solidFill>
+          <a:ln>
+            <a:noFill/>
+          </a:ln>
+        </p:spPr>
+        <p:style>
+          <a:lnRef idx="2">
+            <a:schemeClr val="accent1">
+              <a:shade val="50000"/>
+            </a:schemeClr>
+          </a:lnRef>
+          <a:fillRef idx="1">
+            <a:schemeClr val="accent1"/>
+          </a:fillRef>
+          <a:effectRef idx="0">
+            <a:schemeClr val="accent1"/>
+          </a:effectRef>
+          <a:fontRef idx="minor">
+            <a:schemeClr val="lt1"/>
+          </a:fontRef>
+        </p:style>
+        <p:txBody>
+          <a:bodyPr rtlCol="0" anchor="ctr"/>
+          <a:lstStyle/>
+          <a:p>
+            <a:pPr algn="ctr"/>
+            <a:endParaRPr lang="en-GB"/>
+          </a:p>
+        </p:txBody>
+      </p:sp>
+      <p:sp>
+        <p:nvSpPr>
+          <p:cNvPr id="28" name="Oval 27"/>
+          <p:cNvSpPr/>
+          <p:nvPr/>
+        </p:nvSpPr>
+        <p:spPr>
+          <a:xfrm>
+            <a:off x="2411760" y="3779891"/>
+            <a:ext cx="216024" cy="216024"/>
+          </a:xfrm>
+          <a:prstGeom prst="ellipse">
+            <a:avLst/>
+          </a:prstGeom>
+          <a:solidFill>
+            <a:srgbClr val="FF0000"/>
+          </a:solidFill>
+          <a:ln>
+            <a:noFill/>
+          </a:ln>
+        </p:spPr>
+        <p:style>
+          <a:lnRef idx="2">
+            <a:schemeClr val="accent1">
+              <a:shade val="50000"/>
+            </a:schemeClr>
+          </a:lnRef>
+          <a:fillRef idx="1">
+            <a:schemeClr val="accent1"/>
+          </a:fillRef>
+          <a:effectRef idx="0">
+            <a:schemeClr val="accent1"/>
+          </a:effectRef>
+          <a:fontRef idx="minor">
+            <a:schemeClr val="lt1"/>
+          </a:fontRef>
+        </p:style>
+        <p:txBody>
+          <a:bodyPr rtlCol="0" anchor="ctr"/>
+          <a:lstStyle/>
+          <a:p>
+            <a:pPr algn="ctr"/>
+            <a:endParaRPr lang="en-GB"/>
+          </a:p>
+        </p:txBody>
+      </p:sp>
+      <p:sp>
+        <p:nvSpPr>
+          <p:cNvPr id="29" name="Oval 28"/>
+          <p:cNvSpPr/>
+          <p:nvPr/>
+        </p:nvSpPr>
+        <p:spPr>
+          <a:xfrm>
+            <a:off x="3275856" y="3779891"/>
+            <a:ext cx="216024" cy="216024"/>
+          </a:xfrm>
+          <a:prstGeom prst="ellipse">
+            <a:avLst/>
+          </a:prstGeom>
+          <a:solidFill>
+            <a:srgbClr val="FF0000"/>
+          </a:solidFill>
+          <a:ln>
+            <a:noFill/>
+          </a:ln>
+        </p:spPr>
+        <p:style>
+          <a:lnRef idx="2">
+            <a:schemeClr val="accent1">
+              <a:shade val="50000"/>
+            </a:schemeClr>
+          </a:lnRef>
+          <a:fillRef idx="1">
+            <a:schemeClr val="accent1"/>
+          </a:fillRef>
+          <a:effectRef idx="0">
+            <a:schemeClr val="accent1"/>
+          </a:effectRef>
+          <a:fontRef idx="minor">
+            <a:schemeClr val="lt1"/>
+          </a:fontRef>
+        </p:style>
+        <p:txBody>
+          <a:bodyPr rtlCol="0" anchor="ctr"/>
+          <a:lstStyle/>
+          <a:p>
+            <a:pPr algn="ctr"/>
+            <a:endParaRPr lang="en-GB"/>
+          </a:p>
+        </p:txBody>
+      </p:sp>
+      <p:cxnSp>
+        <p:nvCxnSpPr>
+          <p:cNvPr id="3" name="Straight Arrow Connector 2"/>
+          <p:cNvCxnSpPr/>
+          <p:nvPr/>
+        </p:nvCxnSpPr>
+        <p:spPr>
+          <a:xfrm>
+            <a:off x="4287911" y="1331619"/>
+            <a:ext cx="0" cy="3456384"/>
+          </a:xfrm>
+          <a:prstGeom prst="straightConnector1">
+            <a:avLst/>
+          </a:prstGeom>
+          <a:ln w="12700">
+            <a:solidFill>
+              <a:schemeClr val="tx1"/>
+            </a:solidFill>
+            <a:headEnd type="triangle"/>
+            <a:tailEnd type="triangle"/>
+          </a:ln>
+        </p:spPr>
+        <p:style>
+          <a:lnRef idx="1">
+            <a:schemeClr val="accent1"/>
+          </a:lnRef>
+          <a:fillRef idx="0">
+            <a:schemeClr val="accent1"/>
+          </a:fillRef>
+          <a:effectRef idx="0">
+            <a:schemeClr val="accent1"/>
+          </a:effectRef>
+          <a:fontRef idx="minor">
+            <a:schemeClr val="tx1"/>
+          </a:fontRef>
+        </p:style>
+      </p:cxnSp>
+      <p:cxnSp>
+        <p:nvCxnSpPr>
+          <p:cNvPr id="38" name="Straight Arrow Connector 37"/>
+          <p:cNvCxnSpPr/>
+          <p:nvPr/>
+        </p:nvCxnSpPr>
+        <p:spPr>
+          <a:xfrm>
+            <a:off x="1043608" y="5237079"/>
+            <a:ext cx="2736304" cy="0"/>
+          </a:xfrm>
+          <a:prstGeom prst="straightConnector1">
+            <a:avLst/>
+          </a:prstGeom>
+          <a:ln w="12700">
+            <a:solidFill>
+              <a:schemeClr val="tx1"/>
+            </a:solidFill>
+            <a:headEnd type="triangle"/>
+            <a:tailEnd type="triangle"/>
+          </a:ln>
+        </p:spPr>
+        <p:style>
+          <a:lnRef idx="1">
+            <a:schemeClr val="accent1"/>
+          </a:lnRef>
+          <a:fillRef idx="0">
+            <a:schemeClr val="accent1"/>
+          </a:fillRef>
+          <a:effectRef idx="0">
+            <a:schemeClr val="accent1"/>
+          </a:effectRef>
+          <a:fontRef idx="minor">
+            <a:schemeClr val="tx1"/>
+          </a:fontRef>
+        </p:style>
+      </p:cxnSp>
+      <p:grpSp>
+        <p:nvGrpSpPr>
+          <p:cNvPr id="9" name="Group 8"/>
+          <p:cNvGrpSpPr/>
+          <p:nvPr/>
+        </p:nvGrpSpPr>
+        <p:grpSpPr>
+          <a:xfrm>
+            <a:off x="1358033" y="2143041"/>
+            <a:ext cx="2089305" cy="2041403"/>
+            <a:chOff x="1718073" y="2008174"/>
+            <a:chExt cx="2089305" cy="2041403"/>
+          </a:xfrm>
+        </p:grpSpPr>
+        <p:sp>
+          <p:nvSpPr>
+            <p:cNvPr id="7" name="TextBox 6"/>
+            <p:cNvSpPr txBox="1"/>
+            <p:nvPr/>
+          </p:nvSpPr>
+          <p:spPr>
+            <a:xfrm>
+              <a:off x="1718073" y="2008174"/>
+              <a:ext cx="360040" cy="307777"/>
+            </a:xfrm>
+            <a:prstGeom prst="rect">
+              <a:avLst/>
+            </a:prstGeom>
+            <a:noFill/>
+          </p:spPr>
+          <p:txBody>
+            <a:bodyPr wrap="square" rtlCol="0">
+              <a:spAutoFit/>
+            </a:bodyPr>
+            <a:lstStyle/>
+            <a:p>
+              <a:r>
+                <a:rPr lang="en-GB" sz="1400" dirty="0" smtClean="0"/>
+                <a:t>1</a:t>
+              </a:r>
+              <a:endParaRPr lang="en-US" sz="1400" dirty="0"/>
+            </a:p>
+          </p:txBody>
+        </p:sp>
+        <p:sp>
+          <p:nvSpPr>
+            <p:cNvPr id="39" name="TextBox 38"/>
+            <p:cNvSpPr txBox="1"/>
+            <p:nvPr/>
+          </p:nvSpPr>
+          <p:spPr>
+            <a:xfrm>
+              <a:off x="2586547" y="2008174"/>
+              <a:ext cx="360040" cy="307777"/>
+            </a:xfrm>
+            <a:prstGeom prst="rect">
+              <a:avLst/>
+            </a:prstGeom>
+            <a:noFill/>
+          </p:spPr>
+          <p:txBody>
+            <a:bodyPr wrap="square" rtlCol="0">
+              <a:spAutoFit/>
+            </a:bodyPr>
+            <a:lstStyle/>
+            <a:p>
+              <a:r>
+                <a:rPr lang="en-GB" sz="1400" dirty="0" smtClean="0"/>
+                <a:t>2</a:t>
+              </a:r>
+              <a:endParaRPr lang="en-US" sz="1400" dirty="0"/>
+            </a:p>
+          </p:txBody>
+        </p:sp>
+        <p:sp>
+          <p:nvSpPr>
+            <p:cNvPr id="40" name="TextBox 39"/>
+            <p:cNvSpPr txBox="1"/>
+            <p:nvPr/>
+          </p:nvSpPr>
+          <p:spPr>
+            <a:xfrm>
+              <a:off x="3447338" y="2008174"/>
+              <a:ext cx="360040" cy="307777"/>
+            </a:xfrm>
+            <a:prstGeom prst="rect">
+              <a:avLst/>
+            </a:prstGeom>
+            <a:noFill/>
+          </p:spPr>
+          <p:txBody>
+            <a:bodyPr wrap="square" rtlCol="0">
+              <a:spAutoFit/>
+            </a:bodyPr>
+            <a:lstStyle/>
+            <a:p>
+              <a:r>
+                <a:rPr lang="en-GB" sz="1400" dirty="0"/>
+                <a:t>3</a:t>
+              </a:r>
+              <a:endParaRPr lang="en-US" sz="1400" dirty="0"/>
+            </a:p>
+          </p:txBody>
+        </p:sp>
+        <p:sp>
+          <p:nvSpPr>
+            <p:cNvPr id="41" name="TextBox 40"/>
+            <p:cNvSpPr txBox="1"/>
+            <p:nvPr/>
+          </p:nvSpPr>
+          <p:spPr>
+            <a:xfrm>
+              <a:off x="1718073" y="2874987"/>
+              <a:ext cx="360040" cy="307777"/>
+            </a:xfrm>
+            <a:prstGeom prst="rect">
+              <a:avLst/>
+            </a:prstGeom>
+            <a:noFill/>
+          </p:spPr>
+          <p:txBody>
+            <a:bodyPr wrap="square" rtlCol="0">
+              <a:spAutoFit/>
+            </a:bodyPr>
+            <a:lstStyle/>
+            <a:p>
+              <a:r>
+                <a:rPr lang="en-GB" sz="1400" dirty="0" smtClean="0"/>
+                <a:t>4</a:t>
+              </a:r>
+              <a:endParaRPr lang="en-US" sz="1400" dirty="0"/>
+            </a:p>
+          </p:txBody>
+        </p:sp>
+        <p:sp>
+          <p:nvSpPr>
+            <p:cNvPr id="42" name="TextBox 41"/>
+            <p:cNvSpPr txBox="1"/>
+            <p:nvPr/>
+          </p:nvSpPr>
+          <p:spPr>
+            <a:xfrm>
+              <a:off x="2586547" y="2874987"/>
+              <a:ext cx="360040" cy="307777"/>
+            </a:xfrm>
+            <a:prstGeom prst="rect">
+              <a:avLst/>
+            </a:prstGeom>
+            <a:noFill/>
+          </p:spPr>
+          <p:txBody>
+            <a:bodyPr wrap="square" rtlCol="0">
+              <a:spAutoFit/>
+            </a:bodyPr>
+            <a:lstStyle/>
+            <a:p>
+              <a:r>
+                <a:rPr lang="en-GB" sz="1400" dirty="0" smtClean="0"/>
+                <a:t>5</a:t>
+              </a:r>
+              <a:endParaRPr lang="en-US" sz="1400" dirty="0"/>
+            </a:p>
+          </p:txBody>
+        </p:sp>
+        <p:sp>
+          <p:nvSpPr>
+            <p:cNvPr id="43" name="TextBox 42"/>
+            <p:cNvSpPr txBox="1"/>
+            <p:nvPr/>
+          </p:nvSpPr>
+          <p:spPr>
+            <a:xfrm>
+              <a:off x="3447338" y="2874987"/>
+              <a:ext cx="360040" cy="307777"/>
+            </a:xfrm>
+            <a:prstGeom prst="rect">
+              <a:avLst/>
+            </a:prstGeom>
+            <a:noFill/>
+          </p:spPr>
+          <p:txBody>
+            <a:bodyPr wrap="square" rtlCol="0">
+              <a:spAutoFit/>
+            </a:bodyPr>
+            <a:lstStyle/>
+            <a:p>
+              <a:r>
+                <a:rPr lang="en-GB" sz="1400" dirty="0" smtClean="0"/>
+                <a:t>6</a:t>
+              </a:r>
+              <a:endParaRPr lang="en-US" sz="1400" dirty="0"/>
+            </a:p>
+          </p:txBody>
+        </p:sp>
+        <p:sp>
+          <p:nvSpPr>
+            <p:cNvPr id="44" name="TextBox 43"/>
+            <p:cNvSpPr txBox="1"/>
+            <p:nvPr/>
+          </p:nvSpPr>
+          <p:spPr>
+            <a:xfrm>
+              <a:off x="1718073" y="3741800"/>
+              <a:ext cx="360040" cy="307777"/>
+            </a:xfrm>
+            <a:prstGeom prst="rect">
+              <a:avLst/>
+            </a:prstGeom>
+            <a:noFill/>
+          </p:spPr>
+          <p:txBody>
+            <a:bodyPr wrap="square" rtlCol="0">
+              <a:spAutoFit/>
+            </a:bodyPr>
+            <a:lstStyle/>
+            <a:p>
+              <a:r>
+                <a:rPr lang="en-GB" sz="1400" dirty="0" smtClean="0"/>
+                <a:t>7</a:t>
+              </a:r>
+              <a:endParaRPr lang="en-US" sz="1400" dirty="0"/>
+            </a:p>
+          </p:txBody>
+        </p:sp>
+        <p:sp>
+          <p:nvSpPr>
+            <p:cNvPr id="45" name="TextBox 44"/>
+            <p:cNvSpPr txBox="1"/>
+            <p:nvPr/>
+          </p:nvSpPr>
+          <p:spPr>
+            <a:xfrm>
+              <a:off x="2586547" y="3741800"/>
+              <a:ext cx="360040" cy="307777"/>
+            </a:xfrm>
+            <a:prstGeom prst="rect">
+              <a:avLst/>
+            </a:prstGeom>
+            <a:noFill/>
+          </p:spPr>
+          <p:txBody>
+            <a:bodyPr wrap="square" rtlCol="0">
+              <a:spAutoFit/>
+            </a:bodyPr>
+            <a:lstStyle/>
+            <a:p>
+              <a:r>
+                <a:rPr lang="en-GB" sz="1400" dirty="0" smtClean="0"/>
+                <a:t>8</a:t>
+              </a:r>
+              <a:endParaRPr lang="en-US" sz="1400" dirty="0"/>
+            </a:p>
+          </p:txBody>
+        </p:sp>
+        <p:sp>
+          <p:nvSpPr>
+            <p:cNvPr id="46" name="TextBox 45"/>
+            <p:cNvSpPr txBox="1"/>
+            <p:nvPr/>
+          </p:nvSpPr>
+          <p:spPr>
+            <a:xfrm>
+              <a:off x="3447338" y="3741800"/>
+              <a:ext cx="360040" cy="307777"/>
+            </a:xfrm>
+            <a:prstGeom prst="rect">
+              <a:avLst/>
+            </a:prstGeom>
+            <a:noFill/>
+          </p:spPr>
+          <p:txBody>
+            <a:bodyPr wrap="square" rtlCol="0">
+              <a:spAutoFit/>
+            </a:bodyPr>
+            <a:lstStyle/>
+            <a:p>
+              <a:r>
+                <a:rPr lang="en-GB" sz="1400" dirty="0" smtClean="0"/>
+                <a:t>9</a:t>
+              </a:r>
+              <a:endParaRPr lang="en-US" sz="1400" dirty="0"/>
+            </a:p>
+          </p:txBody>
+        </p:sp>
+      </p:grpSp>
+      <p:sp>
+        <p:nvSpPr>
+          <p:cNvPr id="47" name="TextBox 46"/>
+          <p:cNvSpPr txBox="1"/>
+          <p:nvPr/>
+        </p:nvSpPr>
+        <p:spPr>
+          <a:xfrm>
+            <a:off x="916700" y="977748"/>
+            <a:ext cx="360040" cy="307777"/>
+          </a:xfrm>
+          <a:prstGeom prst="rect">
+            <a:avLst/>
+          </a:prstGeom>
+          <a:noFill/>
+        </p:spPr>
+        <p:txBody>
+          <a:bodyPr wrap="square" rtlCol="0">
+            <a:spAutoFit/>
+          </a:bodyPr>
+          <a:lstStyle/>
+          <a:p>
+            <a:r>
+              <a:rPr lang="en-GB" sz="1400" dirty="0" smtClean="0"/>
+              <a:t>1</a:t>
+            </a:r>
+            <a:endParaRPr lang="en-US" sz="1400" dirty="0"/>
+          </a:p>
+        </p:txBody>
+      </p:sp>
+      <p:sp>
+        <p:nvSpPr>
+          <p:cNvPr id="48" name="TextBox 47"/>
+          <p:cNvSpPr txBox="1"/>
+          <p:nvPr/>
+        </p:nvSpPr>
+        <p:spPr>
+          <a:xfrm>
+            <a:off x="2603838" y="4298079"/>
+            <a:ext cx="360040" cy="307777"/>
+          </a:xfrm>
+          <a:prstGeom prst="rect">
+            <a:avLst/>
+          </a:prstGeom>
+          <a:noFill/>
+        </p:spPr>
+        <p:txBody>
+          <a:bodyPr wrap="square" rtlCol="0">
+            <a:spAutoFit/>
+          </a:bodyPr>
+          <a:lstStyle/>
+          <a:p>
+            <a:r>
+              <a:rPr lang="en-GB" sz="1400" dirty="0" smtClean="0"/>
+              <a:t>2</a:t>
+            </a:r>
+            <a:endParaRPr lang="en-US" sz="1400" dirty="0"/>
+          </a:p>
+        </p:txBody>
+      </p:sp>
+      <p:sp>
+        <p:nvSpPr>
+          <p:cNvPr id="49" name="TextBox 48"/>
+          <p:cNvSpPr txBox="1"/>
+          <p:nvPr/>
+        </p:nvSpPr>
+        <p:spPr>
+          <a:xfrm>
+            <a:off x="3419872" y="1599906"/>
+            <a:ext cx="360040" cy="307777"/>
+          </a:xfrm>
+          <a:prstGeom prst="rect">
+            <a:avLst/>
+          </a:prstGeom>
+          <a:noFill/>
+        </p:spPr>
+        <p:txBody>
+          <a:bodyPr wrap="square" rtlCol="0">
+            <a:spAutoFit/>
+          </a:bodyPr>
+          <a:lstStyle/>
+          <a:p>
+            <a:r>
+              <a:rPr lang="en-GB" sz="1400" dirty="0"/>
+              <a:t>3</a:t>
+            </a:r>
+            <a:endParaRPr lang="en-US" sz="1400" dirty="0"/>
+          </a:p>
+        </p:txBody>
+      </p:sp>
+      <p:sp>
+        <p:nvSpPr>
+          <p:cNvPr id="53" name="TextBox 52"/>
+          <p:cNvSpPr txBox="1"/>
+          <p:nvPr/>
+        </p:nvSpPr>
+        <p:spPr>
+          <a:xfrm rot="5400000">
+            <a:off x="3988576" y="3009853"/>
+            <a:ext cx="859071" cy="307777"/>
+          </a:xfrm>
+          <a:prstGeom prst="rect">
+            <a:avLst/>
+          </a:prstGeom>
+          <a:noFill/>
+        </p:spPr>
+        <p:txBody>
+          <a:bodyPr wrap="square" rtlCol="0">
+            <a:spAutoFit/>
+          </a:bodyPr>
+          <a:lstStyle/>
+          <a:p>
+            <a:r>
+              <a:rPr lang="en-GB" sz="1400" dirty="0" smtClean="0"/>
+              <a:t>31 cm</a:t>
+            </a:r>
+            <a:endParaRPr lang="en-US" sz="1400" dirty="0"/>
+          </a:p>
+        </p:txBody>
+      </p:sp>
+      <p:sp>
+        <p:nvSpPr>
+          <p:cNvPr id="54" name="TextBox 53"/>
+          <p:cNvSpPr txBox="1"/>
+          <p:nvPr/>
+        </p:nvSpPr>
+        <p:spPr>
+          <a:xfrm>
+            <a:off x="882373" y="224207"/>
+            <a:ext cx="859071" cy="307777"/>
+          </a:xfrm>
+          <a:prstGeom prst="rect">
+            <a:avLst/>
+          </a:prstGeom>
+          <a:noFill/>
+        </p:spPr>
+        <p:txBody>
+          <a:bodyPr wrap="square" rtlCol="0">
+            <a:spAutoFit/>
+          </a:bodyPr>
+          <a:lstStyle/>
+          <a:p>
+            <a:r>
+              <a:rPr lang="en-GB" sz="1400" dirty="0" smtClean="0"/>
+              <a:t>25 cm</a:t>
+            </a:r>
+            <a:endParaRPr lang="en-US" sz="1400" dirty="0"/>
+          </a:p>
+        </p:txBody>
+      </p:sp>
+      <p:sp>
+        <p:nvSpPr>
+          <p:cNvPr id="55" name="TextBox 54"/>
+          <p:cNvSpPr txBox="1"/>
+          <p:nvPr/>
+        </p:nvSpPr>
+        <p:spPr>
+          <a:xfrm>
+            <a:off x="2082491" y="5200306"/>
+            <a:ext cx="859071" cy="307777"/>
+          </a:xfrm>
+          <a:prstGeom prst="rect">
+            <a:avLst/>
+          </a:prstGeom>
+          <a:noFill/>
+        </p:spPr>
+        <p:txBody>
+          <a:bodyPr wrap="square" rtlCol="0">
+            <a:spAutoFit/>
+          </a:bodyPr>
+          <a:lstStyle/>
+          <a:p>
+            <a:r>
+              <a:rPr lang="en-GB" sz="1400" dirty="0" smtClean="0"/>
+              <a:t>24 cm</a:t>
+            </a:r>
+            <a:endParaRPr lang="en-US" sz="1400" dirty="0"/>
+          </a:p>
+        </p:txBody>
+      </p:sp>
+      <p:cxnSp>
+        <p:nvCxnSpPr>
+          <p:cNvPr id="56" name="Straight Arrow Connector 55"/>
+          <p:cNvCxnSpPr/>
+          <p:nvPr/>
+        </p:nvCxnSpPr>
+        <p:spPr>
+          <a:xfrm flipV="1">
+            <a:off x="897188" y="2123707"/>
+            <a:ext cx="0" cy="910706"/>
+          </a:xfrm>
+          <a:prstGeom prst="straightConnector1">
+            <a:avLst/>
+          </a:prstGeom>
+          <a:ln w="12700">
+            <a:solidFill>
+              <a:schemeClr val="tx1"/>
+            </a:solidFill>
+            <a:headEnd type="triangle"/>
+            <a:tailEnd type="triangle"/>
+          </a:ln>
+        </p:spPr>
+        <p:style>
+          <a:lnRef idx="1">
+            <a:schemeClr val="accent1"/>
+          </a:lnRef>
+          <a:fillRef idx="0">
+            <a:schemeClr val="accent1"/>
+          </a:fillRef>
+          <a:effectRef idx="0">
+            <a:schemeClr val="accent1"/>
+          </a:effectRef>
+          <a:fontRef idx="minor">
+            <a:schemeClr val="tx1"/>
+          </a:fontRef>
+        </p:style>
+      </p:cxnSp>
+      <p:sp>
+        <p:nvSpPr>
+          <p:cNvPr id="57" name="TextBox 56"/>
+          <p:cNvSpPr txBox="1"/>
+          <p:nvPr/>
+        </p:nvSpPr>
+        <p:spPr>
+          <a:xfrm rot="16200000">
+            <a:off x="329809" y="2296929"/>
+            <a:ext cx="859071" cy="307777"/>
+          </a:xfrm>
+          <a:prstGeom prst="rect">
+            <a:avLst/>
+          </a:prstGeom>
+          <a:noFill/>
+        </p:spPr>
+        <p:txBody>
+          <a:bodyPr wrap="square" rtlCol="0">
+            <a:spAutoFit/>
+          </a:bodyPr>
+          <a:lstStyle/>
+          <a:p>
+            <a:r>
+              <a:rPr lang="en-GB" sz="1400" dirty="0"/>
+              <a:t>8</a:t>
+            </a:r>
+            <a:r>
+              <a:rPr lang="en-GB" sz="1400" dirty="0" smtClean="0"/>
+              <a:t> cm</a:t>
+            </a:r>
+            <a:endParaRPr lang="en-US" sz="1400" dirty="0"/>
+          </a:p>
+        </p:txBody>
+      </p:sp>
+      <p:cxnSp>
+        <p:nvCxnSpPr>
+          <p:cNvPr id="60" name="Straight Arrow Connector 59"/>
+          <p:cNvCxnSpPr/>
+          <p:nvPr/>
+        </p:nvCxnSpPr>
+        <p:spPr>
+          <a:xfrm flipV="1">
+            <a:off x="892096" y="1331619"/>
+            <a:ext cx="5092" cy="801584"/>
+          </a:xfrm>
+          <a:prstGeom prst="straightConnector1">
+            <a:avLst/>
+          </a:prstGeom>
+          <a:ln w="12700">
+            <a:solidFill>
+              <a:schemeClr val="tx1"/>
+            </a:solidFill>
+            <a:headEnd type="triangle"/>
+            <a:tailEnd type="triangle"/>
+          </a:ln>
+        </p:spPr>
+        <p:style>
+          <a:lnRef idx="1">
+            <a:schemeClr val="accent1"/>
+          </a:lnRef>
+          <a:fillRef idx="0">
+            <a:schemeClr val="accent1"/>
+          </a:fillRef>
+          <a:effectRef idx="0">
+            <a:schemeClr val="accent1"/>
+          </a:effectRef>
+          <a:fontRef idx="minor">
+            <a:schemeClr val="tx1"/>
+          </a:fontRef>
+        </p:style>
+      </p:cxnSp>
+      <p:sp>
+        <p:nvSpPr>
+          <p:cNvPr id="61" name="TextBox 60"/>
+          <p:cNvSpPr txBox="1"/>
+          <p:nvPr/>
+        </p:nvSpPr>
+        <p:spPr>
+          <a:xfrm rot="16200000">
+            <a:off x="324717" y="1395719"/>
+            <a:ext cx="859071" cy="307777"/>
+          </a:xfrm>
+          <a:prstGeom prst="rect">
+            <a:avLst/>
+          </a:prstGeom>
+          <a:noFill/>
+        </p:spPr>
+        <p:txBody>
+          <a:bodyPr wrap="square" rtlCol="0">
+            <a:spAutoFit/>
+          </a:bodyPr>
+          <a:lstStyle/>
+          <a:p>
+            <a:r>
+              <a:rPr lang="en-GB" sz="1400" dirty="0"/>
+              <a:t>8</a:t>
+            </a:r>
+            <a:r>
+              <a:rPr lang="en-GB" sz="1400" dirty="0" smtClean="0"/>
+              <a:t> cm</a:t>
+            </a:r>
+            <a:endParaRPr lang="en-US" sz="1400" dirty="0"/>
+          </a:p>
+        </p:txBody>
+      </p:sp>
+      <p:cxnSp>
+        <p:nvCxnSpPr>
+          <p:cNvPr id="63" name="Straight Arrow Connector 62"/>
+          <p:cNvCxnSpPr/>
+          <p:nvPr/>
+        </p:nvCxnSpPr>
+        <p:spPr>
+          <a:xfrm flipV="1">
+            <a:off x="903292" y="3878642"/>
+            <a:ext cx="0" cy="910706"/>
+          </a:xfrm>
+          <a:prstGeom prst="straightConnector1">
+            <a:avLst/>
+          </a:prstGeom>
+          <a:ln w="12700">
+            <a:solidFill>
+              <a:schemeClr val="tx1"/>
+            </a:solidFill>
+            <a:headEnd type="triangle"/>
+            <a:tailEnd type="triangle"/>
+          </a:ln>
+        </p:spPr>
+        <p:style>
+          <a:lnRef idx="1">
+            <a:schemeClr val="accent1"/>
+          </a:lnRef>
+          <a:fillRef idx="0">
+            <a:schemeClr val="accent1"/>
+          </a:fillRef>
+          <a:effectRef idx="0">
+            <a:schemeClr val="accent1"/>
+          </a:effectRef>
+          <a:fontRef idx="minor">
+            <a:schemeClr val="tx1"/>
+          </a:fontRef>
+        </p:style>
+      </p:cxnSp>
+      <p:sp>
+        <p:nvSpPr>
+          <p:cNvPr id="64" name="TextBox 63"/>
+          <p:cNvSpPr txBox="1"/>
+          <p:nvPr/>
+        </p:nvSpPr>
+        <p:spPr>
+          <a:xfrm rot="16200000">
+            <a:off x="335913" y="4051864"/>
+            <a:ext cx="859071" cy="307777"/>
+          </a:xfrm>
+          <a:prstGeom prst="rect">
+            <a:avLst/>
+          </a:prstGeom>
+          <a:noFill/>
+        </p:spPr>
+        <p:txBody>
+          <a:bodyPr wrap="square" rtlCol="0">
+            <a:spAutoFit/>
+          </a:bodyPr>
+          <a:lstStyle/>
+          <a:p>
+            <a:r>
+              <a:rPr lang="en-GB" sz="1400" dirty="0"/>
+              <a:t>8</a:t>
+            </a:r>
+            <a:r>
+              <a:rPr lang="en-GB" sz="1400" dirty="0" smtClean="0"/>
+              <a:t> cm</a:t>
+            </a:r>
+            <a:endParaRPr lang="en-US" sz="1400" dirty="0"/>
+          </a:p>
+        </p:txBody>
+      </p:sp>
+      <p:cxnSp>
+        <p:nvCxnSpPr>
+          <p:cNvPr id="65" name="Straight Arrow Connector 64"/>
+          <p:cNvCxnSpPr/>
+          <p:nvPr/>
+        </p:nvCxnSpPr>
+        <p:spPr>
+          <a:xfrm>
+            <a:off x="1044191" y="4913632"/>
+            <a:ext cx="647489" cy="0"/>
+          </a:xfrm>
+          <a:prstGeom prst="straightConnector1">
+            <a:avLst/>
+          </a:prstGeom>
+          <a:ln w="12700">
+            <a:solidFill>
+              <a:schemeClr val="tx1"/>
+            </a:solidFill>
+            <a:headEnd type="triangle"/>
+            <a:tailEnd type="triangle"/>
+          </a:ln>
+        </p:spPr>
+        <p:style>
+          <a:lnRef idx="1">
+            <a:schemeClr val="accent1"/>
+          </a:lnRef>
+          <a:fillRef idx="0">
+            <a:schemeClr val="accent1"/>
+          </a:fillRef>
+          <a:effectRef idx="0">
+            <a:schemeClr val="accent1"/>
+          </a:effectRef>
+          <a:fontRef idx="minor">
+            <a:schemeClr val="tx1"/>
+          </a:fontRef>
+        </p:style>
+      </p:cxnSp>
+      <p:sp>
+        <p:nvSpPr>
+          <p:cNvPr id="66" name="TextBox 65"/>
+          <p:cNvSpPr txBox="1"/>
+          <p:nvPr/>
+        </p:nvSpPr>
+        <p:spPr>
+          <a:xfrm>
+            <a:off x="1096720" y="4903849"/>
+            <a:ext cx="859071" cy="307777"/>
+          </a:xfrm>
+          <a:prstGeom prst="rect">
+            <a:avLst/>
+          </a:prstGeom>
+          <a:noFill/>
+        </p:spPr>
+        <p:txBody>
+          <a:bodyPr wrap="square" rtlCol="0">
+            <a:spAutoFit/>
+          </a:bodyPr>
+          <a:lstStyle/>
+          <a:p>
+            <a:r>
+              <a:rPr lang="en-GB" sz="1400" dirty="0" smtClean="0"/>
+              <a:t>6 cm</a:t>
+            </a:r>
+            <a:endParaRPr lang="en-US" sz="1400" dirty="0"/>
+          </a:p>
+        </p:txBody>
+      </p:sp>
+      <p:cxnSp>
+        <p:nvCxnSpPr>
+          <p:cNvPr id="68" name="Straight Arrow Connector 67"/>
+          <p:cNvCxnSpPr/>
+          <p:nvPr/>
+        </p:nvCxnSpPr>
+        <p:spPr>
+          <a:xfrm>
+            <a:off x="1691680" y="4913632"/>
+            <a:ext cx="864096" cy="0"/>
+          </a:xfrm>
+          <a:prstGeom prst="straightConnector1">
+            <a:avLst/>
+          </a:prstGeom>
+          <a:ln w="12700">
+            <a:solidFill>
+              <a:schemeClr val="tx1"/>
+            </a:solidFill>
+            <a:headEnd type="triangle"/>
+            <a:tailEnd type="triangle"/>
+          </a:ln>
+        </p:spPr>
+        <p:style>
+          <a:lnRef idx="1">
+            <a:schemeClr val="accent1"/>
+          </a:lnRef>
+          <a:fillRef idx="0">
+            <a:schemeClr val="accent1"/>
+          </a:fillRef>
+          <a:effectRef idx="0">
+            <a:schemeClr val="accent1"/>
+          </a:effectRef>
+          <a:fontRef idx="minor">
+            <a:schemeClr val="tx1"/>
+          </a:fontRef>
+        </p:style>
+      </p:cxnSp>
+      <p:sp>
+        <p:nvSpPr>
+          <p:cNvPr id="69" name="TextBox 68"/>
+          <p:cNvSpPr txBox="1"/>
+          <p:nvPr/>
+        </p:nvSpPr>
+        <p:spPr>
+          <a:xfrm>
+            <a:off x="1907704" y="4903849"/>
+            <a:ext cx="859071" cy="307777"/>
+          </a:xfrm>
+          <a:prstGeom prst="rect">
+            <a:avLst/>
+          </a:prstGeom>
+          <a:noFill/>
+        </p:spPr>
+        <p:txBody>
+          <a:bodyPr wrap="square" rtlCol="0">
+            <a:spAutoFit/>
+          </a:bodyPr>
+          <a:lstStyle/>
+          <a:p>
+            <a:r>
+              <a:rPr lang="en-GB" sz="1400" dirty="0" smtClean="0"/>
+              <a:t>8 cm</a:t>
+            </a:r>
+            <a:endParaRPr lang="en-US" sz="1400" dirty="0"/>
+          </a:p>
+        </p:txBody>
+      </p:sp>
+      <p:cxnSp>
+        <p:nvCxnSpPr>
+          <p:cNvPr id="71" name="Straight Arrow Connector 70"/>
+          <p:cNvCxnSpPr/>
+          <p:nvPr/>
+        </p:nvCxnSpPr>
+        <p:spPr>
+          <a:xfrm>
+            <a:off x="3419872" y="4913632"/>
+            <a:ext cx="383961" cy="0"/>
+          </a:xfrm>
+          <a:prstGeom prst="straightConnector1">
+            <a:avLst/>
+          </a:prstGeom>
+          <a:ln w="12700">
+            <a:solidFill>
+              <a:schemeClr val="tx1"/>
+            </a:solidFill>
+            <a:headEnd type="triangle"/>
+            <a:tailEnd type="triangle"/>
+          </a:ln>
+        </p:spPr>
+        <p:style>
+          <a:lnRef idx="1">
+            <a:schemeClr val="accent1"/>
+          </a:lnRef>
+          <a:fillRef idx="0">
+            <a:schemeClr val="accent1"/>
+          </a:fillRef>
+          <a:effectRef idx="0">
+            <a:schemeClr val="accent1"/>
+          </a:effectRef>
+          <a:fontRef idx="minor">
+            <a:schemeClr val="tx1"/>
+          </a:fontRef>
+        </p:style>
+      </p:cxnSp>
+      <p:sp>
+        <p:nvSpPr>
+          <p:cNvPr id="72" name="TextBox 71"/>
+          <p:cNvSpPr txBox="1"/>
+          <p:nvPr/>
+        </p:nvSpPr>
+        <p:spPr>
+          <a:xfrm>
+            <a:off x="3347864" y="4903849"/>
+            <a:ext cx="859071" cy="307777"/>
+          </a:xfrm>
+          <a:prstGeom prst="rect">
+            <a:avLst/>
+          </a:prstGeom>
+          <a:noFill/>
+        </p:spPr>
+        <p:txBody>
+          <a:bodyPr wrap="square" rtlCol="0">
+            <a:spAutoFit/>
+          </a:bodyPr>
+          <a:lstStyle/>
+          <a:p>
+            <a:r>
+              <a:rPr lang="en-GB" sz="1400" dirty="0" smtClean="0"/>
+              <a:t>2 cm</a:t>
+            </a:r>
+            <a:endParaRPr lang="en-US" sz="1400" dirty="0"/>
+          </a:p>
+        </p:txBody>
+      </p:sp>
+      <p:cxnSp>
+        <p:nvCxnSpPr>
+          <p:cNvPr id="74" name="Straight Arrow Connector 73"/>
+          <p:cNvCxnSpPr/>
+          <p:nvPr/>
+        </p:nvCxnSpPr>
+        <p:spPr>
+          <a:xfrm>
+            <a:off x="2550751" y="4913632"/>
+            <a:ext cx="864096" cy="0"/>
+          </a:xfrm>
+          <a:prstGeom prst="straightConnector1">
+            <a:avLst/>
+          </a:prstGeom>
+          <a:ln w="12700">
+            <a:solidFill>
+              <a:schemeClr val="tx1"/>
+            </a:solidFill>
+            <a:headEnd type="triangle"/>
+            <a:tailEnd type="triangle"/>
+          </a:ln>
+        </p:spPr>
+        <p:style>
+          <a:lnRef idx="1">
+            <a:schemeClr val="accent1"/>
+          </a:lnRef>
+          <a:fillRef idx="0">
+            <a:schemeClr val="accent1"/>
+          </a:fillRef>
+          <a:effectRef idx="0">
+            <a:schemeClr val="accent1"/>
+          </a:effectRef>
+          <a:fontRef idx="minor">
+            <a:schemeClr val="tx1"/>
+          </a:fontRef>
+        </p:style>
+      </p:cxnSp>
+      <p:sp>
+        <p:nvSpPr>
+          <p:cNvPr id="75" name="TextBox 74"/>
+          <p:cNvSpPr txBox="1"/>
+          <p:nvPr/>
+        </p:nvSpPr>
+        <p:spPr>
+          <a:xfrm>
+            <a:off x="2766775" y="4903849"/>
+            <a:ext cx="859071" cy="307777"/>
+          </a:xfrm>
+          <a:prstGeom prst="rect">
+            <a:avLst/>
+          </a:prstGeom>
+          <a:noFill/>
+        </p:spPr>
+        <p:txBody>
+          <a:bodyPr wrap="square" rtlCol="0">
+            <a:spAutoFit/>
+          </a:bodyPr>
+          <a:lstStyle/>
+          <a:p>
+            <a:r>
+              <a:rPr lang="en-GB" sz="1400" dirty="0" smtClean="0"/>
+              <a:t>8 cm</a:t>
+            </a:r>
+            <a:endParaRPr lang="en-US" sz="1400" dirty="0"/>
+          </a:p>
+        </p:txBody>
+      </p:sp>
+      <p:cxnSp>
+        <p:nvCxnSpPr>
+          <p:cNvPr id="76" name="Straight Arrow Connector 75"/>
+          <p:cNvCxnSpPr/>
+          <p:nvPr/>
+        </p:nvCxnSpPr>
+        <p:spPr>
+          <a:xfrm flipV="1">
+            <a:off x="3905911" y="4355955"/>
+            <a:ext cx="0" cy="452639"/>
+          </a:xfrm>
+          <a:prstGeom prst="straightConnector1">
+            <a:avLst/>
+          </a:prstGeom>
+          <a:ln w="12700">
+            <a:solidFill>
+              <a:schemeClr val="tx1"/>
+            </a:solidFill>
+            <a:headEnd type="triangle"/>
+            <a:tailEnd type="triangle"/>
+          </a:ln>
+        </p:spPr>
+        <p:style>
+          <a:lnRef idx="1">
+            <a:schemeClr val="accent1"/>
+          </a:lnRef>
+          <a:fillRef idx="0">
+            <a:schemeClr val="accent1"/>
+          </a:fillRef>
+          <a:effectRef idx="0">
+            <a:schemeClr val="accent1"/>
+          </a:effectRef>
+          <a:fontRef idx="minor">
+            <a:schemeClr val="tx1"/>
+          </a:fontRef>
+        </p:style>
+      </p:cxnSp>
+      <p:sp>
+        <p:nvSpPr>
+          <p:cNvPr id="77" name="TextBox 76"/>
+          <p:cNvSpPr txBox="1"/>
+          <p:nvPr/>
+        </p:nvSpPr>
+        <p:spPr>
+          <a:xfrm rot="5400000">
+            <a:off x="3790532" y="4450304"/>
+            <a:ext cx="548407" cy="307777"/>
+          </a:xfrm>
+          <a:prstGeom prst="rect">
+            <a:avLst/>
+          </a:prstGeom>
+          <a:noFill/>
+        </p:spPr>
+        <p:txBody>
+          <a:bodyPr wrap="square" rtlCol="0">
+            <a:spAutoFit/>
+          </a:bodyPr>
+          <a:lstStyle/>
+          <a:p>
+            <a:r>
+              <a:rPr lang="en-GB" sz="1400" dirty="0" smtClean="0"/>
+              <a:t>3 cm</a:t>
+            </a:r>
+            <a:endParaRPr lang="en-US" sz="1400" dirty="0"/>
+          </a:p>
+        </p:txBody>
+      </p:sp>
+      <p:cxnSp>
+        <p:nvCxnSpPr>
+          <p:cNvPr id="82" name="Straight Arrow Connector 81"/>
+          <p:cNvCxnSpPr/>
+          <p:nvPr/>
+        </p:nvCxnSpPr>
+        <p:spPr>
+          <a:xfrm flipV="1">
+            <a:off x="3924780" y="1323393"/>
+            <a:ext cx="0" cy="452639"/>
+          </a:xfrm>
+          <a:prstGeom prst="straightConnector1">
+            <a:avLst/>
+          </a:prstGeom>
+          <a:ln w="12700">
+            <a:solidFill>
+              <a:schemeClr val="tx1"/>
+            </a:solidFill>
+            <a:headEnd type="triangle"/>
+            <a:tailEnd type="triangle"/>
+          </a:ln>
+        </p:spPr>
+        <p:style>
+          <a:lnRef idx="1">
+            <a:schemeClr val="accent1"/>
+          </a:lnRef>
+          <a:fillRef idx="0">
+            <a:schemeClr val="accent1"/>
+          </a:fillRef>
+          <a:effectRef idx="0">
+            <a:schemeClr val="accent1"/>
+          </a:effectRef>
+          <a:fontRef idx="minor">
+            <a:schemeClr val="tx1"/>
+          </a:fontRef>
+        </p:style>
+      </p:cxnSp>
+      <p:sp>
+        <p:nvSpPr>
+          <p:cNvPr id="83" name="TextBox 82"/>
+          <p:cNvSpPr txBox="1"/>
+          <p:nvPr/>
+        </p:nvSpPr>
+        <p:spPr>
+          <a:xfrm rot="5400000">
+            <a:off x="3809401" y="1417742"/>
+            <a:ext cx="548407" cy="307777"/>
+          </a:xfrm>
+          <a:prstGeom prst="rect">
+            <a:avLst/>
+          </a:prstGeom>
+          <a:noFill/>
+        </p:spPr>
+        <p:txBody>
+          <a:bodyPr wrap="square" rtlCol="0">
+            <a:spAutoFit/>
+          </a:bodyPr>
+          <a:lstStyle/>
+          <a:p>
+            <a:r>
+              <a:rPr lang="en-GB" sz="1400" dirty="0" smtClean="0"/>
+              <a:t>3 cm</a:t>
+            </a:r>
+            <a:endParaRPr lang="en-US" sz="1400" dirty="0"/>
+          </a:p>
+        </p:txBody>
+      </p:sp>
+      <p:cxnSp>
+        <p:nvCxnSpPr>
+          <p:cNvPr id="84" name="Straight Arrow Connector 83"/>
+          <p:cNvCxnSpPr/>
+          <p:nvPr/>
+        </p:nvCxnSpPr>
+        <p:spPr>
+          <a:xfrm>
+            <a:off x="3275856" y="1187603"/>
+            <a:ext cx="547417" cy="4892"/>
+          </a:xfrm>
+          <a:prstGeom prst="straightConnector1">
+            <a:avLst/>
+          </a:prstGeom>
+          <a:ln w="12700">
+            <a:solidFill>
+              <a:schemeClr val="tx1"/>
+            </a:solidFill>
+            <a:headEnd type="triangle"/>
+            <a:tailEnd type="triangle"/>
+          </a:ln>
+        </p:spPr>
+        <p:style>
+          <a:lnRef idx="1">
+            <a:schemeClr val="accent1"/>
+          </a:lnRef>
+          <a:fillRef idx="0">
+            <a:schemeClr val="accent1"/>
+          </a:fillRef>
+          <a:effectRef idx="0">
+            <a:schemeClr val="accent1"/>
+          </a:effectRef>
+          <a:fontRef idx="minor">
+            <a:schemeClr val="tx1"/>
+          </a:fontRef>
+        </p:style>
+      </p:cxnSp>
+      <p:sp>
+        <p:nvSpPr>
+          <p:cNvPr id="85" name="TextBox 84"/>
+          <p:cNvSpPr txBox="1"/>
+          <p:nvPr/>
+        </p:nvSpPr>
+        <p:spPr>
+          <a:xfrm>
+            <a:off x="3305718" y="879826"/>
+            <a:ext cx="859071" cy="307777"/>
+          </a:xfrm>
+          <a:prstGeom prst="rect">
+            <a:avLst/>
+          </a:prstGeom>
+          <a:noFill/>
+        </p:spPr>
+        <p:txBody>
+          <a:bodyPr wrap="square" rtlCol="0">
+            <a:spAutoFit/>
+          </a:bodyPr>
+          <a:lstStyle/>
+          <a:p>
+            <a:r>
+              <a:rPr lang="en-GB" sz="1400" dirty="0" smtClean="0"/>
+              <a:t>3 cm</a:t>
+            </a:r>
+            <a:endParaRPr lang="en-US" sz="1400" dirty="0"/>
+          </a:p>
+        </p:txBody>
+      </p:sp>
+      <p:grpSp>
+        <p:nvGrpSpPr>
+          <p:cNvPr id="96" name="Group 95"/>
+          <p:cNvGrpSpPr/>
+          <p:nvPr/>
+        </p:nvGrpSpPr>
+        <p:grpSpPr>
+          <a:xfrm rot="19423553">
+            <a:off x="-178332" y="69552"/>
+            <a:ext cx="711696" cy="429229"/>
+            <a:chOff x="475928" y="263467"/>
+            <a:chExt cx="711696" cy="429229"/>
+          </a:xfrm>
+        </p:grpSpPr>
+        <p:grpSp>
+          <p:nvGrpSpPr>
+            <p:cNvPr id="95" name="Group 94"/>
+            <p:cNvGrpSpPr/>
+            <p:nvPr/>
+          </p:nvGrpSpPr>
+          <p:grpSpPr>
+            <a:xfrm>
+              <a:off x="475928" y="404664"/>
+              <a:ext cx="711696" cy="288032"/>
+              <a:chOff x="475928" y="404664"/>
+              <a:chExt cx="711696" cy="288032"/>
+            </a:xfrm>
+          </p:grpSpPr>
+          <p:sp>
+            <p:nvSpPr>
+              <p:cNvPr id="88" name="Rectangle 87"/>
+              <p:cNvSpPr/>
+              <p:nvPr/>
+            </p:nvSpPr>
+            <p:spPr>
+              <a:xfrm>
+                <a:off x="683568" y="404664"/>
+                <a:ext cx="288032" cy="72008"/>
+              </a:xfrm>
+              <a:prstGeom prst="rect">
+                <a:avLst/>
+              </a:prstGeom>
+              <a:noFill/>
+              <a:ln w="12700">
+                <a:solidFill>
+                  <a:schemeClr val="tx1"/>
+                </a:solidFill>
+              </a:ln>
+            </p:spPr>
+            <p:style>
+              <a:lnRef idx="2">
+                <a:schemeClr val="accent1">
+                  <a:shade val="50000"/>
+                </a:schemeClr>
+              </a:lnRef>
+              <a:fillRef idx="1">
+                <a:schemeClr val="accent1"/>
+              </a:fillRef>
+              <a:effectRef idx="0">
+                <a:schemeClr val="accent1"/>
+              </a:effectRef>
+              <a:fontRef idx="minor">
+                <a:schemeClr val="lt1"/>
+              </a:fontRef>
+            </p:style>
+            <p:txBody>
+              <a:bodyPr rtlCol="0" anchor="ctr"/>
+              <a:lstStyle/>
+              <a:p>
+                <a:pPr algn="ctr"/>
+                <a:endParaRPr lang="en-US"/>
+              </a:p>
+            </p:txBody>
+          </p:sp>
+          <p:grpSp>
+            <p:nvGrpSpPr>
+              <p:cNvPr id="93" name="Group 92"/>
+              <p:cNvGrpSpPr/>
+              <p:nvPr/>
+            </p:nvGrpSpPr>
+            <p:grpSpPr>
+              <a:xfrm>
+                <a:off x="475928" y="477914"/>
+                <a:ext cx="711696" cy="214782"/>
+                <a:chOff x="331912" y="477914"/>
+                <a:chExt cx="999728" cy="237626"/>
+              </a:xfrm>
+            </p:grpSpPr>
+            <p:cxnSp>
+              <p:nvCxnSpPr>
+                <p:cNvPr id="90" name="Straight Connector 89"/>
+                <p:cNvCxnSpPr/>
+                <p:nvPr/>
+              </p:nvCxnSpPr>
+              <p:spPr>
+                <a:xfrm flipH="1">
+                  <a:off x="331912" y="477914"/>
+                  <a:ext cx="432048" cy="237626"/>
+                </a:xfrm>
+                <a:prstGeom prst="line">
+                  <a:avLst/>
+                </a:prstGeom>
+                <a:ln w="12700">
+                  <a:solidFill>
+                    <a:schemeClr val="tx1"/>
+                  </a:solidFill>
+                </a:ln>
+              </p:spPr>
+              <p:style>
+                <a:lnRef idx="1">
+                  <a:schemeClr val="accent1"/>
+                </a:lnRef>
+                <a:fillRef idx="0">
+                  <a:schemeClr val="accent1"/>
+                </a:fillRef>
+                <a:effectRef idx="0">
+                  <a:schemeClr val="accent1"/>
+                </a:effectRef>
+                <a:fontRef idx="minor">
+                  <a:schemeClr val="tx1"/>
+                </a:fontRef>
+              </p:style>
+            </p:cxnSp>
+            <p:cxnSp>
+              <p:nvCxnSpPr>
+                <p:cNvPr id="92" name="Straight Connector 91"/>
+                <p:cNvCxnSpPr/>
+                <p:nvPr/>
+              </p:nvCxnSpPr>
+              <p:spPr>
+                <a:xfrm flipH="1" flipV="1">
+                  <a:off x="899592" y="477914"/>
+                  <a:ext cx="432048" cy="237626"/>
+                </a:xfrm>
+                <a:prstGeom prst="line">
+                  <a:avLst/>
+                </a:prstGeom>
+                <a:ln w="12700">
+                  <a:solidFill>
+                    <a:schemeClr val="tx1"/>
+                  </a:solidFill>
+                </a:ln>
+              </p:spPr>
+              <p:style>
+                <a:lnRef idx="1">
+                  <a:schemeClr val="accent1"/>
+                </a:lnRef>
+                <a:fillRef idx="0">
+                  <a:schemeClr val="accent1"/>
+                </a:fillRef>
+                <a:effectRef idx="0">
+                  <a:schemeClr val="accent1"/>
+                </a:effectRef>
+                <a:fontRef idx="minor">
+                  <a:schemeClr val="tx1"/>
+                </a:fontRef>
+              </p:style>
+            </p:cxnSp>
+          </p:grpSp>
+        </p:grpSp>
+        <p:sp>
+          <p:nvSpPr>
+            <p:cNvPr id="94" name="Arc 93"/>
+            <p:cNvSpPr/>
+            <p:nvPr/>
+          </p:nvSpPr>
+          <p:spPr>
+            <a:xfrm rot="8007923">
+              <a:off x="683454" y="248227"/>
+              <a:ext cx="288032" cy="318512"/>
+            </a:xfrm>
+            <a:prstGeom prst="arc">
+              <a:avLst/>
+            </a:prstGeom>
+            <a:ln w="12700">
+              <a:solidFill>
+                <a:schemeClr val="tx1"/>
+              </a:solidFill>
+            </a:ln>
+          </p:spPr>
+          <p:style>
+            <a:lnRef idx="1">
+              <a:schemeClr val="accent1"/>
+            </a:lnRef>
+            <a:fillRef idx="0">
+              <a:schemeClr val="accent1"/>
+            </a:fillRef>
+            <a:effectRef idx="0">
+              <a:schemeClr val="accent1"/>
+            </a:effectRef>
+            <a:fontRef idx="minor">
+              <a:schemeClr val="tx1"/>
+            </a:fontRef>
+          </p:style>
+          <p:txBody>
+            <a:bodyPr rtlCol="0" anchor="ctr"/>
+            <a:lstStyle/>
+            <a:p>
+              <a:pPr algn="ctr"/>
+              <a:endParaRPr lang="en-US"/>
+            </a:p>
+          </p:txBody>
+        </p:sp>
+      </p:grpSp>
+      <p:grpSp>
+        <p:nvGrpSpPr>
+          <p:cNvPr id="97" name="Group 96"/>
+          <p:cNvGrpSpPr/>
+          <p:nvPr/>
+        </p:nvGrpSpPr>
+        <p:grpSpPr>
+          <a:xfrm rot="2270814">
+            <a:off x="4321049" y="127942"/>
+            <a:ext cx="711696" cy="429229"/>
+            <a:chOff x="475928" y="263467"/>
+            <a:chExt cx="711696" cy="429229"/>
+          </a:xfrm>
+        </p:grpSpPr>
+        <p:grpSp>
+          <p:nvGrpSpPr>
+            <p:cNvPr id="98" name="Group 97"/>
+            <p:cNvGrpSpPr/>
+            <p:nvPr/>
+          </p:nvGrpSpPr>
+          <p:grpSpPr>
+            <a:xfrm>
+              <a:off x="475928" y="404664"/>
+              <a:ext cx="711696" cy="288032"/>
+              <a:chOff x="475928" y="404664"/>
+              <a:chExt cx="711696" cy="288032"/>
+            </a:xfrm>
+          </p:grpSpPr>
+          <p:sp>
+            <p:nvSpPr>
+              <p:cNvPr id="100" name="Rectangle 99"/>
+              <p:cNvSpPr/>
+              <p:nvPr/>
+            </p:nvSpPr>
+            <p:spPr>
+              <a:xfrm>
+                <a:off x="683568" y="404664"/>
+                <a:ext cx="288032" cy="72008"/>
+              </a:xfrm>
+              <a:prstGeom prst="rect">
+                <a:avLst/>
+              </a:prstGeom>
+              <a:noFill/>
+              <a:ln w="12700">
+                <a:solidFill>
+                  <a:schemeClr val="tx1"/>
+                </a:solidFill>
+              </a:ln>
+            </p:spPr>
+            <p:style>
+              <a:lnRef idx="2">
+                <a:schemeClr val="accent1">
+                  <a:shade val="50000"/>
+                </a:schemeClr>
+              </a:lnRef>
+              <a:fillRef idx="1">
+                <a:schemeClr val="accent1"/>
+              </a:fillRef>
+              <a:effectRef idx="0">
+                <a:schemeClr val="accent1"/>
+              </a:effectRef>
+              <a:fontRef idx="minor">
+                <a:schemeClr val="lt1"/>
+              </a:fontRef>
+            </p:style>
+            <p:txBody>
+              <a:bodyPr rtlCol="0" anchor="ctr"/>
+              <a:lstStyle/>
+              <a:p>
+                <a:pPr algn="ctr"/>
+                <a:endParaRPr lang="en-US"/>
+              </a:p>
+            </p:txBody>
+          </p:sp>
+          <p:grpSp>
+            <p:nvGrpSpPr>
+              <p:cNvPr id="101" name="Group 100"/>
+              <p:cNvGrpSpPr/>
+              <p:nvPr/>
+            </p:nvGrpSpPr>
+            <p:grpSpPr>
+              <a:xfrm>
+                <a:off x="475928" y="477914"/>
+                <a:ext cx="711696" cy="214782"/>
+                <a:chOff x="331912" y="477914"/>
+                <a:chExt cx="999728" cy="237626"/>
+              </a:xfrm>
+            </p:grpSpPr>
+            <p:cxnSp>
+              <p:nvCxnSpPr>
+                <p:cNvPr id="102" name="Straight Connector 101"/>
+                <p:cNvCxnSpPr/>
+                <p:nvPr/>
+              </p:nvCxnSpPr>
+              <p:spPr>
+                <a:xfrm flipH="1">
+                  <a:off x="331912" y="477914"/>
+                  <a:ext cx="432048" cy="237626"/>
+                </a:xfrm>
+                <a:prstGeom prst="line">
+                  <a:avLst/>
+                </a:prstGeom>
+                <a:ln w="12700">
+                  <a:solidFill>
+                    <a:schemeClr val="tx1"/>
+                  </a:solidFill>
+                </a:ln>
+              </p:spPr>
+              <p:style>
+                <a:lnRef idx="1">
+                  <a:schemeClr val="accent1"/>
+                </a:lnRef>
+                <a:fillRef idx="0">
+                  <a:schemeClr val="accent1"/>
+                </a:fillRef>
+                <a:effectRef idx="0">
+                  <a:schemeClr val="accent1"/>
+                </a:effectRef>
+                <a:fontRef idx="minor">
+                  <a:schemeClr val="tx1"/>
+                </a:fontRef>
+              </p:style>
+            </p:cxnSp>
+            <p:cxnSp>
+              <p:nvCxnSpPr>
+                <p:cNvPr id="103" name="Straight Connector 102"/>
+                <p:cNvCxnSpPr/>
+                <p:nvPr/>
+              </p:nvCxnSpPr>
+              <p:spPr>
+                <a:xfrm flipH="1" flipV="1">
+                  <a:off x="899592" y="477914"/>
+                  <a:ext cx="432048" cy="237626"/>
+                </a:xfrm>
+                <a:prstGeom prst="line">
+                  <a:avLst/>
+                </a:prstGeom>
+                <a:ln w="12700">
+                  <a:solidFill>
+                    <a:schemeClr val="tx1"/>
+                  </a:solidFill>
+                </a:ln>
+              </p:spPr>
+              <p:style>
+                <a:lnRef idx="1">
+                  <a:schemeClr val="accent1"/>
+                </a:lnRef>
+                <a:fillRef idx="0">
+                  <a:schemeClr val="accent1"/>
+                </a:fillRef>
+                <a:effectRef idx="0">
+                  <a:schemeClr val="accent1"/>
+                </a:effectRef>
+                <a:fontRef idx="minor">
+                  <a:schemeClr val="tx1"/>
+                </a:fontRef>
+              </p:style>
+            </p:cxnSp>
+          </p:grpSp>
+        </p:grpSp>
+        <p:sp>
+          <p:nvSpPr>
+            <p:cNvPr id="99" name="Arc 98"/>
+            <p:cNvSpPr/>
+            <p:nvPr/>
+          </p:nvSpPr>
+          <p:spPr>
+            <a:xfrm rot="8007923">
+              <a:off x="683454" y="248227"/>
+              <a:ext cx="288032" cy="318512"/>
+            </a:xfrm>
+            <a:prstGeom prst="arc">
+              <a:avLst/>
+            </a:prstGeom>
+            <a:ln w="12700">
+              <a:solidFill>
+                <a:schemeClr val="tx1"/>
+              </a:solidFill>
+            </a:ln>
+          </p:spPr>
+          <p:style>
+            <a:lnRef idx="1">
+              <a:schemeClr val="accent1"/>
+            </a:lnRef>
+            <a:fillRef idx="0">
+              <a:schemeClr val="accent1"/>
+            </a:fillRef>
+            <a:effectRef idx="0">
+              <a:schemeClr val="accent1"/>
+            </a:effectRef>
+            <a:fontRef idx="minor">
+              <a:schemeClr val="tx1"/>
+            </a:fontRef>
+          </p:style>
+          <p:txBody>
+            <a:bodyPr rtlCol="0" anchor="ctr"/>
+            <a:lstStyle/>
+            <a:p>
+              <a:pPr algn="ctr"/>
+              <a:endParaRPr lang="en-US"/>
+            </a:p>
+          </p:txBody>
+        </p:sp>
+      </p:grpSp>
+      <p:cxnSp>
+        <p:nvCxnSpPr>
+          <p:cNvPr id="104" name="Straight Arrow Connector 103"/>
+          <p:cNvCxnSpPr/>
+          <p:nvPr/>
+        </p:nvCxnSpPr>
+        <p:spPr>
+          <a:xfrm flipH="1" flipV="1">
+            <a:off x="469960" y="11894"/>
+            <a:ext cx="954175" cy="894599"/>
+          </a:xfrm>
+          <a:prstGeom prst="straightConnector1">
+            <a:avLst/>
+          </a:prstGeom>
+          <a:ln w="12700">
+            <a:solidFill>
+              <a:schemeClr val="tx1"/>
+            </a:solidFill>
+            <a:headEnd type="triangle"/>
+            <a:tailEnd type="triangle"/>
+          </a:ln>
+        </p:spPr>
+        <p:style>
+          <a:lnRef idx="1">
+            <a:schemeClr val="accent1"/>
+          </a:lnRef>
+          <a:fillRef idx="0">
+            <a:schemeClr val="accent1"/>
+          </a:fillRef>
+          <a:effectRef idx="0">
+            <a:schemeClr val="accent1"/>
+          </a:effectRef>
+          <a:fontRef idx="minor">
+            <a:schemeClr val="tx1"/>
+          </a:fontRef>
+        </p:style>
+      </p:cxnSp>
+      <p:cxnSp>
+        <p:nvCxnSpPr>
+          <p:cNvPr id="107" name="Straight Arrow Connector 106"/>
+          <p:cNvCxnSpPr/>
+          <p:nvPr/>
+        </p:nvCxnSpPr>
+        <p:spPr>
+          <a:xfrm flipH="1">
+            <a:off x="3267318" y="-20124"/>
+            <a:ext cx="840022" cy="827942"/>
+          </a:xfrm>
+          <a:prstGeom prst="straightConnector1">
+            <a:avLst/>
+          </a:prstGeom>
+          <a:ln w="12700">
+            <a:solidFill>
+              <a:schemeClr val="tx1"/>
+            </a:solidFill>
+            <a:headEnd type="triangle"/>
+            <a:tailEnd type="triangle"/>
+          </a:ln>
+        </p:spPr>
+        <p:style>
+          <a:lnRef idx="1">
+            <a:schemeClr val="accent1"/>
+          </a:lnRef>
+          <a:fillRef idx="0">
+            <a:schemeClr val="accent1"/>
+          </a:fillRef>
+          <a:effectRef idx="0">
+            <a:schemeClr val="accent1"/>
+          </a:effectRef>
+          <a:fontRef idx="minor">
+            <a:schemeClr val="tx1"/>
+          </a:fontRef>
+        </p:style>
+      </p:cxnSp>
+      <p:sp>
+        <p:nvSpPr>
+          <p:cNvPr id="111" name="TextBox 110"/>
+          <p:cNvSpPr txBox="1"/>
+          <p:nvPr/>
+        </p:nvSpPr>
+        <p:spPr>
+          <a:xfrm>
+            <a:off x="2913821" y="264272"/>
+            <a:ext cx="859071" cy="307777"/>
+          </a:xfrm>
+          <a:prstGeom prst="rect">
+            <a:avLst/>
+          </a:prstGeom>
+          <a:noFill/>
+        </p:spPr>
+        <p:txBody>
+          <a:bodyPr wrap="square" rtlCol="0">
+            <a:spAutoFit/>
+          </a:bodyPr>
+          <a:lstStyle/>
+          <a:p>
+            <a:r>
+              <a:rPr lang="en-GB" sz="1400" dirty="0" smtClean="0"/>
+              <a:t>25 cm</a:t>
+            </a:r>
+            <a:endParaRPr lang="en-US" sz="1400" dirty="0"/>
+          </a:p>
+        </p:txBody>
+      </p:sp>
+      <p:grpSp>
+        <p:nvGrpSpPr>
+          <p:cNvPr id="121" name="Group 120"/>
+          <p:cNvGrpSpPr/>
+          <p:nvPr/>
+        </p:nvGrpSpPr>
+        <p:grpSpPr>
+          <a:xfrm>
+            <a:off x="4550393" y="1297427"/>
+            <a:ext cx="2192913" cy="3112857"/>
+            <a:chOff x="4550393" y="1297427"/>
+            <a:chExt cx="2192913" cy="3112857"/>
           </a:xfrm>
         </p:grpSpPr>
         <p:sp>
@@ -3081,7 +5584,7 @@
           </p:nvSpPr>
           <p:spPr>
             <a:xfrm>
-              <a:off x="5940152" y="2132856"/>
+              <a:off x="4742154" y="2561852"/>
               <a:ext cx="864096" cy="432048"/>
             </a:xfrm>
             <a:prstGeom prst="roundRect">
@@ -3129,7 +5632,7 @@
           </p:nvSpPr>
           <p:spPr>
             <a:xfrm>
-              <a:off x="5796136" y="2348880"/>
+              <a:off x="4943106" y="2459830"/>
               <a:ext cx="1800200" cy="1656184"/>
             </a:xfrm>
             <a:prstGeom prst="rect">
@@ -3169,763 +5672,13 @@
         </p:sp>
         <p:sp>
           <p:nvSpPr>
-            <p:cNvPr id="5" name="Rounded Rectangle 4"/>
-            <p:cNvSpPr/>
-            <p:nvPr/>
-          </p:nvSpPr>
-          <p:spPr>
-            <a:xfrm>
-              <a:off x="2843808" y="1556792"/>
-              <a:ext cx="2736304" cy="3456384"/>
-            </a:xfrm>
-            <a:prstGeom prst="roundRect">
-              <a:avLst>
-                <a:gd name="adj" fmla="val 2290"/>
-              </a:avLst>
-            </a:prstGeom>
-            <a:noFill/>
-            <a:ln w="38100">
-              <a:solidFill>
-                <a:schemeClr val="tx1"/>
-              </a:solidFill>
-            </a:ln>
-          </p:spPr>
-          <p:style>
-            <a:lnRef idx="2">
-              <a:schemeClr val="accent1">
-                <a:shade val="50000"/>
-              </a:schemeClr>
-            </a:lnRef>
-            <a:fillRef idx="1">
-              <a:schemeClr val="accent1"/>
-            </a:fillRef>
-            <a:effectRef idx="0">
-              <a:schemeClr val="accent1"/>
-            </a:effectRef>
-            <a:fontRef idx="minor">
-              <a:schemeClr val="lt1"/>
-            </a:fontRef>
-          </p:style>
-          <p:txBody>
-            <a:bodyPr rtlCol="0" anchor="ctr"/>
-            <a:lstStyle/>
-            <a:p>
-              <a:pPr algn="ctr"/>
-              <a:endParaRPr lang="en-GB"/>
-            </a:p>
-          </p:txBody>
-        </p:sp>
-        <p:grpSp>
-          <p:nvGrpSpPr>
-            <p:cNvPr id="13" name="Group 12"/>
-            <p:cNvGrpSpPr/>
-            <p:nvPr/>
-          </p:nvGrpSpPr>
-          <p:grpSpPr>
-            <a:xfrm>
-              <a:off x="2411760" y="1196752"/>
-              <a:ext cx="274116" cy="218405"/>
-              <a:chOff x="1371328" y="1410395"/>
-              <a:chExt cx="274116" cy="218405"/>
-            </a:xfrm>
-          </p:grpSpPr>
-          <p:sp>
-            <p:nvSpPr>
-              <p:cNvPr id="6" name="Oval 5"/>
-              <p:cNvSpPr/>
-              <p:nvPr/>
-            </p:nvSpPr>
-            <p:spPr>
-              <a:xfrm>
-                <a:off x="1403648" y="1412776"/>
-                <a:ext cx="216024" cy="216024"/>
-              </a:xfrm>
-              <a:prstGeom prst="ellipse">
-                <a:avLst/>
-              </a:prstGeom>
-              <a:noFill/>
-              <a:ln w="38100">
-                <a:solidFill>
-                  <a:schemeClr val="tx1"/>
-                </a:solidFill>
-              </a:ln>
-            </p:spPr>
-            <p:style>
-              <a:lnRef idx="2">
-                <a:schemeClr val="accent1">
-                  <a:shade val="50000"/>
-                </a:schemeClr>
-              </a:lnRef>
-              <a:fillRef idx="1">
-                <a:schemeClr val="accent1"/>
-              </a:fillRef>
-              <a:effectRef idx="0">
-                <a:schemeClr val="accent1"/>
-              </a:effectRef>
-              <a:fontRef idx="minor">
-                <a:schemeClr val="lt1"/>
-              </a:fontRef>
-            </p:style>
-            <p:txBody>
-              <a:bodyPr rtlCol="0" anchor="ctr"/>
-              <a:lstStyle/>
-              <a:p>
-                <a:pPr algn="ctr"/>
-                <a:endParaRPr lang="en-GB"/>
-              </a:p>
-            </p:txBody>
-          </p:sp>
-          <p:cxnSp>
-            <p:nvCxnSpPr>
-              <p:cNvPr id="8" name="Straight Connector 7"/>
-              <p:cNvCxnSpPr/>
-              <p:nvPr/>
-            </p:nvCxnSpPr>
-            <p:spPr>
-              <a:xfrm>
-                <a:off x="1371328" y="1410395"/>
-                <a:ext cx="274116" cy="1687"/>
-              </a:xfrm>
-              <a:prstGeom prst="line">
-                <a:avLst/>
-              </a:prstGeom>
-              <a:ln w="38100">
-                <a:solidFill>
-                  <a:schemeClr val="tx1"/>
-                </a:solidFill>
-              </a:ln>
-            </p:spPr>
-            <p:style>
-              <a:lnRef idx="1">
-                <a:schemeClr val="accent1"/>
-              </a:lnRef>
-              <a:fillRef idx="0">
-                <a:schemeClr val="accent1"/>
-              </a:fillRef>
-              <a:effectRef idx="0">
-                <a:schemeClr val="accent1"/>
-              </a:effectRef>
-              <a:fontRef idx="minor">
-                <a:schemeClr val="tx1"/>
-              </a:fontRef>
-            </p:style>
-          </p:cxnSp>
-        </p:grpSp>
-        <p:grpSp>
-          <p:nvGrpSpPr>
-            <p:cNvPr id="14" name="Group 13"/>
-            <p:cNvGrpSpPr/>
-            <p:nvPr/>
-          </p:nvGrpSpPr>
-          <p:grpSpPr>
-            <a:xfrm>
-              <a:off x="5076056" y="1700808"/>
-              <a:ext cx="274116" cy="218405"/>
-              <a:chOff x="1371328" y="1410395"/>
-              <a:chExt cx="274116" cy="218405"/>
-            </a:xfrm>
-          </p:grpSpPr>
-          <p:sp>
-            <p:nvSpPr>
-              <p:cNvPr id="15" name="Oval 14"/>
-              <p:cNvSpPr/>
-              <p:nvPr/>
-            </p:nvSpPr>
-            <p:spPr>
-              <a:xfrm>
-                <a:off x="1403648" y="1412776"/>
-                <a:ext cx="216024" cy="216024"/>
-              </a:xfrm>
-              <a:prstGeom prst="ellipse">
-                <a:avLst/>
-              </a:prstGeom>
-              <a:noFill/>
-              <a:ln w="38100">
-                <a:solidFill>
-                  <a:schemeClr val="tx1"/>
-                </a:solidFill>
-              </a:ln>
-            </p:spPr>
-            <p:style>
-              <a:lnRef idx="2">
-                <a:schemeClr val="accent1">
-                  <a:shade val="50000"/>
-                </a:schemeClr>
-              </a:lnRef>
-              <a:fillRef idx="1">
-                <a:schemeClr val="accent1"/>
-              </a:fillRef>
-              <a:effectRef idx="0">
-                <a:schemeClr val="accent1"/>
-              </a:effectRef>
-              <a:fontRef idx="minor">
-                <a:schemeClr val="lt1"/>
-              </a:fontRef>
-            </p:style>
-            <p:txBody>
-              <a:bodyPr rtlCol="0" anchor="ctr"/>
-              <a:lstStyle/>
-              <a:p>
-                <a:pPr algn="ctr"/>
-                <a:endParaRPr lang="en-GB"/>
-              </a:p>
-            </p:txBody>
-          </p:sp>
-          <p:cxnSp>
-            <p:nvCxnSpPr>
-              <p:cNvPr id="16" name="Straight Connector 15"/>
-              <p:cNvCxnSpPr/>
-              <p:nvPr/>
-            </p:nvCxnSpPr>
-            <p:spPr>
-              <a:xfrm>
-                <a:off x="1371328" y="1410395"/>
-                <a:ext cx="274116" cy="1687"/>
-              </a:xfrm>
-              <a:prstGeom prst="line">
-                <a:avLst/>
-              </a:prstGeom>
-              <a:ln w="38100">
-                <a:solidFill>
-                  <a:schemeClr val="tx1"/>
-                </a:solidFill>
-              </a:ln>
-            </p:spPr>
-            <p:style>
-              <a:lnRef idx="1">
-                <a:schemeClr val="accent1"/>
-              </a:lnRef>
-              <a:fillRef idx="0">
-                <a:schemeClr val="accent1"/>
-              </a:fillRef>
-              <a:effectRef idx="0">
-                <a:schemeClr val="accent1"/>
-              </a:effectRef>
-              <a:fontRef idx="minor">
-                <a:schemeClr val="tx1"/>
-              </a:fontRef>
-            </p:style>
-          </p:cxnSp>
-        </p:grpSp>
-        <p:grpSp>
-          <p:nvGrpSpPr>
-            <p:cNvPr id="17" name="Group 16"/>
-            <p:cNvGrpSpPr/>
-            <p:nvPr/>
-          </p:nvGrpSpPr>
-          <p:grpSpPr>
-            <a:xfrm>
-              <a:off x="4067944" y="4725144"/>
-              <a:ext cx="274116" cy="218405"/>
-              <a:chOff x="1371328" y="1410395"/>
-              <a:chExt cx="274116" cy="218405"/>
-            </a:xfrm>
-          </p:grpSpPr>
-          <p:sp>
-            <p:nvSpPr>
-              <p:cNvPr id="18" name="Oval 17"/>
-              <p:cNvSpPr/>
-              <p:nvPr/>
-            </p:nvSpPr>
-            <p:spPr>
-              <a:xfrm>
-                <a:off x="1403648" y="1412776"/>
-                <a:ext cx="216024" cy="216024"/>
-              </a:xfrm>
-              <a:prstGeom prst="ellipse">
-                <a:avLst/>
-              </a:prstGeom>
-              <a:noFill/>
-              <a:ln w="38100">
-                <a:solidFill>
-                  <a:schemeClr val="tx1"/>
-                </a:solidFill>
-              </a:ln>
-            </p:spPr>
-            <p:style>
-              <a:lnRef idx="2">
-                <a:schemeClr val="accent1">
-                  <a:shade val="50000"/>
-                </a:schemeClr>
-              </a:lnRef>
-              <a:fillRef idx="1">
-                <a:schemeClr val="accent1"/>
-              </a:fillRef>
-              <a:effectRef idx="0">
-                <a:schemeClr val="accent1"/>
-              </a:effectRef>
-              <a:fontRef idx="minor">
-                <a:schemeClr val="lt1"/>
-              </a:fontRef>
-            </p:style>
-            <p:txBody>
-              <a:bodyPr rtlCol="0" anchor="ctr"/>
-              <a:lstStyle/>
-              <a:p>
-                <a:pPr algn="ctr"/>
-                <a:endParaRPr lang="en-GB"/>
-              </a:p>
-            </p:txBody>
-          </p:sp>
-          <p:cxnSp>
-            <p:nvCxnSpPr>
-              <p:cNvPr id="19" name="Straight Connector 18"/>
-              <p:cNvCxnSpPr/>
-              <p:nvPr/>
-            </p:nvCxnSpPr>
-            <p:spPr>
-              <a:xfrm>
-                <a:off x="1371328" y="1410395"/>
-                <a:ext cx="274116" cy="1687"/>
-              </a:xfrm>
-              <a:prstGeom prst="line">
-                <a:avLst/>
-              </a:prstGeom>
-              <a:ln w="38100">
-                <a:solidFill>
-                  <a:schemeClr val="tx1"/>
-                </a:solidFill>
-              </a:ln>
-            </p:spPr>
-            <p:style>
-              <a:lnRef idx="1">
-                <a:schemeClr val="accent1"/>
-              </a:lnRef>
-              <a:fillRef idx="0">
-                <a:schemeClr val="accent1"/>
-              </a:fillRef>
-              <a:effectRef idx="0">
-                <a:schemeClr val="accent1"/>
-              </a:effectRef>
-              <a:fontRef idx="minor">
-                <a:schemeClr val="tx1"/>
-              </a:fontRef>
-            </p:style>
-          </p:cxnSp>
-        </p:grpSp>
-        <p:sp>
-          <p:nvSpPr>
-            <p:cNvPr id="20" name="Oval 19"/>
-            <p:cNvSpPr/>
-            <p:nvPr/>
-          </p:nvSpPr>
-          <p:spPr>
-            <a:xfrm>
-              <a:off x="3203848" y="2276872"/>
-              <a:ext cx="216024" cy="216024"/>
-            </a:xfrm>
-            <a:prstGeom prst="ellipse">
-              <a:avLst/>
-            </a:prstGeom>
-            <a:solidFill>
-              <a:srgbClr val="FF0000"/>
-            </a:solidFill>
-            <a:ln>
-              <a:noFill/>
-            </a:ln>
-          </p:spPr>
-          <p:style>
-            <a:lnRef idx="2">
-              <a:schemeClr val="accent1">
-                <a:shade val="50000"/>
-              </a:schemeClr>
-            </a:lnRef>
-            <a:fillRef idx="1">
-              <a:schemeClr val="accent1"/>
-            </a:fillRef>
-            <a:effectRef idx="0">
-              <a:schemeClr val="accent1"/>
-            </a:effectRef>
-            <a:fontRef idx="minor">
-              <a:schemeClr val="lt1"/>
-            </a:fontRef>
-          </p:style>
-          <p:txBody>
-            <a:bodyPr rtlCol="0" anchor="ctr"/>
-            <a:lstStyle/>
-            <a:p>
-              <a:pPr algn="ctr"/>
-              <a:endParaRPr lang="en-GB"/>
-            </a:p>
-          </p:txBody>
-        </p:sp>
-        <p:sp>
-          <p:nvSpPr>
-            <p:cNvPr id="21" name="Oval 20"/>
-            <p:cNvSpPr/>
-            <p:nvPr/>
-          </p:nvSpPr>
-          <p:spPr>
-            <a:xfrm>
-              <a:off x="4067944" y="2276872"/>
-              <a:ext cx="216024" cy="216024"/>
-            </a:xfrm>
-            <a:prstGeom prst="ellipse">
-              <a:avLst/>
-            </a:prstGeom>
-            <a:solidFill>
-              <a:srgbClr val="FF0000"/>
-            </a:solidFill>
-            <a:ln>
-              <a:noFill/>
-            </a:ln>
-          </p:spPr>
-          <p:style>
-            <a:lnRef idx="2">
-              <a:schemeClr val="accent1">
-                <a:shade val="50000"/>
-              </a:schemeClr>
-            </a:lnRef>
-            <a:fillRef idx="1">
-              <a:schemeClr val="accent1"/>
-            </a:fillRef>
-            <a:effectRef idx="0">
-              <a:schemeClr val="accent1"/>
-            </a:effectRef>
-            <a:fontRef idx="minor">
-              <a:schemeClr val="lt1"/>
-            </a:fontRef>
-          </p:style>
-          <p:txBody>
-            <a:bodyPr rtlCol="0" anchor="ctr"/>
-            <a:lstStyle/>
-            <a:p>
-              <a:pPr algn="ctr"/>
-              <a:endParaRPr lang="en-GB"/>
-            </a:p>
-          </p:txBody>
-        </p:sp>
-        <p:sp>
-          <p:nvSpPr>
-            <p:cNvPr id="22" name="Oval 21"/>
-            <p:cNvSpPr/>
-            <p:nvPr/>
-          </p:nvSpPr>
-          <p:spPr>
-            <a:xfrm>
-              <a:off x="4932040" y="2276872"/>
-              <a:ext cx="216024" cy="216024"/>
-            </a:xfrm>
-            <a:prstGeom prst="ellipse">
-              <a:avLst/>
-            </a:prstGeom>
-            <a:solidFill>
-              <a:srgbClr val="FF0000"/>
-            </a:solidFill>
-            <a:ln>
-              <a:noFill/>
-            </a:ln>
-          </p:spPr>
-          <p:style>
-            <a:lnRef idx="2">
-              <a:schemeClr val="accent1">
-                <a:shade val="50000"/>
-              </a:schemeClr>
-            </a:lnRef>
-            <a:fillRef idx="1">
-              <a:schemeClr val="accent1"/>
-            </a:fillRef>
-            <a:effectRef idx="0">
-              <a:schemeClr val="accent1"/>
-            </a:effectRef>
-            <a:fontRef idx="minor">
-              <a:schemeClr val="lt1"/>
-            </a:fontRef>
-          </p:style>
-          <p:txBody>
-            <a:bodyPr rtlCol="0" anchor="ctr"/>
-            <a:lstStyle/>
-            <a:p>
-              <a:pPr algn="ctr"/>
-              <a:endParaRPr lang="en-GB"/>
-            </a:p>
-          </p:txBody>
-        </p:sp>
-        <p:sp>
-          <p:nvSpPr>
-            <p:cNvPr id="23" name="Oval 22"/>
-            <p:cNvSpPr/>
-            <p:nvPr/>
-          </p:nvSpPr>
-          <p:spPr>
-            <a:xfrm>
-              <a:off x="3203848" y="3140968"/>
-              <a:ext cx="216024" cy="216024"/>
-            </a:xfrm>
-            <a:prstGeom prst="ellipse">
-              <a:avLst/>
-            </a:prstGeom>
-            <a:solidFill>
-              <a:srgbClr val="FF0000"/>
-            </a:solidFill>
-            <a:ln>
-              <a:noFill/>
-            </a:ln>
-          </p:spPr>
-          <p:style>
-            <a:lnRef idx="2">
-              <a:schemeClr val="accent1">
-                <a:shade val="50000"/>
-              </a:schemeClr>
-            </a:lnRef>
-            <a:fillRef idx="1">
-              <a:schemeClr val="accent1"/>
-            </a:fillRef>
-            <a:effectRef idx="0">
-              <a:schemeClr val="accent1"/>
-            </a:effectRef>
-            <a:fontRef idx="minor">
-              <a:schemeClr val="lt1"/>
-            </a:fontRef>
-          </p:style>
-          <p:txBody>
-            <a:bodyPr rtlCol="0" anchor="ctr"/>
-            <a:lstStyle/>
-            <a:p>
-              <a:pPr algn="ctr"/>
-              <a:endParaRPr lang="en-GB"/>
-            </a:p>
-          </p:txBody>
-        </p:sp>
-        <p:sp>
-          <p:nvSpPr>
-            <p:cNvPr id="24" name="Oval 23"/>
-            <p:cNvSpPr/>
-            <p:nvPr/>
-          </p:nvSpPr>
-          <p:spPr>
-            <a:xfrm>
-              <a:off x="4067944" y="3140968"/>
-              <a:ext cx="216024" cy="216024"/>
-            </a:xfrm>
-            <a:prstGeom prst="ellipse">
-              <a:avLst/>
-            </a:prstGeom>
-            <a:solidFill>
-              <a:srgbClr val="FF0000"/>
-            </a:solidFill>
-            <a:ln>
-              <a:noFill/>
-            </a:ln>
-          </p:spPr>
-          <p:style>
-            <a:lnRef idx="2">
-              <a:schemeClr val="accent1">
-                <a:shade val="50000"/>
-              </a:schemeClr>
-            </a:lnRef>
-            <a:fillRef idx="1">
-              <a:schemeClr val="accent1"/>
-            </a:fillRef>
-            <a:effectRef idx="0">
-              <a:schemeClr val="accent1"/>
-            </a:effectRef>
-            <a:fontRef idx="minor">
-              <a:schemeClr val="lt1"/>
-            </a:fontRef>
-          </p:style>
-          <p:txBody>
-            <a:bodyPr rtlCol="0" anchor="ctr"/>
-            <a:lstStyle/>
-            <a:p>
-              <a:pPr algn="ctr"/>
-              <a:endParaRPr lang="en-GB"/>
-            </a:p>
-          </p:txBody>
-        </p:sp>
-        <p:sp>
-          <p:nvSpPr>
-            <p:cNvPr id="25" name="Oval 24"/>
-            <p:cNvSpPr/>
-            <p:nvPr/>
-          </p:nvSpPr>
-          <p:spPr>
-            <a:xfrm>
-              <a:off x="4932040" y="3140968"/>
-              <a:ext cx="216024" cy="216024"/>
-            </a:xfrm>
-            <a:prstGeom prst="ellipse">
-              <a:avLst/>
-            </a:prstGeom>
-            <a:solidFill>
-              <a:srgbClr val="FF0000"/>
-            </a:solidFill>
-            <a:ln>
-              <a:noFill/>
-            </a:ln>
-          </p:spPr>
-          <p:style>
-            <a:lnRef idx="2">
-              <a:schemeClr val="accent1">
-                <a:shade val="50000"/>
-              </a:schemeClr>
-            </a:lnRef>
-            <a:fillRef idx="1">
-              <a:schemeClr val="accent1"/>
-            </a:fillRef>
-            <a:effectRef idx="0">
-              <a:schemeClr val="accent1"/>
-            </a:effectRef>
-            <a:fontRef idx="minor">
-              <a:schemeClr val="lt1"/>
-            </a:fontRef>
-          </p:style>
-          <p:txBody>
-            <a:bodyPr rtlCol="0" anchor="ctr"/>
-            <a:lstStyle/>
-            <a:p>
-              <a:pPr algn="ctr"/>
-              <a:endParaRPr lang="en-GB"/>
-            </a:p>
-          </p:txBody>
-        </p:sp>
-        <p:sp>
-          <p:nvSpPr>
-            <p:cNvPr id="27" name="Oval 26"/>
-            <p:cNvSpPr/>
-            <p:nvPr/>
-          </p:nvSpPr>
-          <p:spPr>
-            <a:xfrm>
-              <a:off x="3203848" y="4005064"/>
-              <a:ext cx="216024" cy="216024"/>
-            </a:xfrm>
-            <a:prstGeom prst="ellipse">
-              <a:avLst/>
-            </a:prstGeom>
-            <a:solidFill>
-              <a:srgbClr val="FF0000"/>
-            </a:solidFill>
-            <a:ln>
-              <a:noFill/>
-            </a:ln>
-          </p:spPr>
-          <p:style>
-            <a:lnRef idx="2">
-              <a:schemeClr val="accent1">
-                <a:shade val="50000"/>
-              </a:schemeClr>
-            </a:lnRef>
-            <a:fillRef idx="1">
-              <a:schemeClr val="accent1"/>
-            </a:fillRef>
-            <a:effectRef idx="0">
-              <a:schemeClr val="accent1"/>
-            </a:effectRef>
-            <a:fontRef idx="minor">
-              <a:schemeClr val="lt1"/>
-            </a:fontRef>
-          </p:style>
-          <p:txBody>
-            <a:bodyPr rtlCol="0" anchor="ctr"/>
-            <a:lstStyle/>
-            <a:p>
-              <a:pPr algn="ctr"/>
-              <a:endParaRPr lang="en-GB"/>
-            </a:p>
-          </p:txBody>
-        </p:sp>
-        <p:sp>
-          <p:nvSpPr>
-            <p:cNvPr id="28" name="Oval 27"/>
-            <p:cNvSpPr/>
-            <p:nvPr/>
-          </p:nvSpPr>
-          <p:spPr>
-            <a:xfrm>
-              <a:off x="4067944" y="4005064"/>
-              <a:ext cx="216024" cy="216024"/>
-            </a:xfrm>
-            <a:prstGeom prst="ellipse">
-              <a:avLst/>
-            </a:prstGeom>
-            <a:solidFill>
-              <a:srgbClr val="FF0000"/>
-            </a:solidFill>
-            <a:ln>
-              <a:noFill/>
-            </a:ln>
-          </p:spPr>
-          <p:style>
-            <a:lnRef idx="2">
-              <a:schemeClr val="accent1">
-                <a:shade val="50000"/>
-              </a:schemeClr>
-            </a:lnRef>
-            <a:fillRef idx="1">
-              <a:schemeClr val="accent1"/>
-            </a:fillRef>
-            <a:effectRef idx="0">
-              <a:schemeClr val="accent1"/>
-            </a:effectRef>
-            <a:fontRef idx="minor">
-              <a:schemeClr val="lt1"/>
-            </a:fontRef>
-          </p:style>
-          <p:txBody>
-            <a:bodyPr rtlCol="0" anchor="ctr"/>
-            <a:lstStyle/>
-            <a:p>
-              <a:pPr algn="ctr"/>
-              <a:endParaRPr lang="en-GB"/>
-            </a:p>
-          </p:txBody>
-        </p:sp>
-        <p:sp>
-          <p:nvSpPr>
-            <p:cNvPr id="29" name="Oval 28"/>
-            <p:cNvSpPr/>
-            <p:nvPr/>
-          </p:nvSpPr>
-          <p:spPr>
-            <a:xfrm>
-              <a:off x="4932040" y="4005064"/>
-              <a:ext cx="216024" cy="216024"/>
-            </a:xfrm>
-            <a:prstGeom prst="ellipse">
-              <a:avLst/>
-            </a:prstGeom>
-            <a:solidFill>
-              <a:srgbClr val="FF0000"/>
-            </a:solidFill>
-            <a:ln>
-              <a:noFill/>
-            </a:ln>
-          </p:spPr>
-          <p:style>
-            <a:lnRef idx="2">
-              <a:schemeClr val="accent1">
-                <a:shade val="50000"/>
-              </a:schemeClr>
-            </a:lnRef>
-            <a:fillRef idx="1">
-              <a:schemeClr val="accent1"/>
-            </a:fillRef>
-            <a:effectRef idx="0">
-              <a:schemeClr val="accent1"/>
-            </a:effectRef>
-            <a:fontRef idx="minor">
-              <a:schemeClr val="lt1"/>
-            </a:fontRef>
-          </p:style>
-          <p:txBody>
-            <a:bodyPr rtlCol="0" anchor="ctr"/>
-            <a:lstStyle/>
-            <a:p>
-              <a:pPr algn="ctr"/>
-              <a:endParaRPr lang="en-GB"/>
-            </a:p>
-          </p:txBody>
-        </p:sp>
-        <p:sp>
-          <p:nvSpPr>
             <p:cNvPr id="32" name="Rectangle 31"/>
             <p:cNvSpPr/>
             <p:nvPr/>
           </p:nvSpPr>
           <p:spPr>
             <a:xfrm>
-              <a:off x="6156176" y="2060848"/>
+              <a:off x="4550393" y="2754100"/>
               <a:ext cx="1800200" cy="1656184"/>
             </a:xfrm>
             <a:prstGeom prst="rect">
@@ -3971,8 +5724,8 @@
           </p:nvSpPr>
           <p:spPr>
             <a:xfrm>
-              <a:off x="5796136" y="1227232"/>
-              <a:ext cx="2160240" cy="1224136"/>
+              <a:off x="4598138" y="1297427"/>
+              <a:ext cx="1612155" cy="1582937"/>
             </a:xfrm>
             <a:prstGeom prst="rect">
               <a:avLst/>
@@ -4018,7 +5771,7 @@
           </p:nvSpPr>
           <p:spPr>
             <a:xfrm>
-              <a:off x="5940152" y="1772816"/>
+              <a:off x="4742154" y="2201812"/>
               <a:ext cx="216024" cy="216024"/>
             </a:xfrm>
             <a:prstGeom prst="ellipse">
@@ -4064,7 +5817,7 @@
           </p:nvGrpSpPr>
           <p:grpSpPr>
             <a:xfrm>
-              <a:off x="5898624" y="1402775"/>
+              <a:off x="4700626" y="1831771"/>
               <a:ext cx="274116" cy="218405"/>
               <a:chOff x="1371328" y="1410395"/>
               <a:chExt cx="274116" cy="218405"/>
@@ -4152,12 +5905,343 @@
             </p:style>
           </p:cxnSp>
         </p:grpSp>
+        <p:sp>
+          <p:nvSpPr>
+            <p:cNvPr id="50" name="TextBox 49"/>
+            <p:cNvSpPr txBox="1"/>
+            <p:nvPr/>
+          </p:nvSpPr>
+          <p:spPr>
+            <a:xfrm>
+              <a:off x="4994182" y="1774241"/>
+              <a:ext cx="1738400" cy="338554"/>
+            </a:xfrm>
+            <a:prstGeom prst="rect">
+              <a:avLst/>
+            </a:prstGeom>
+            <a:noFill/>
+          </p:spPr>
+          <p:txBody>
+            <a:bodyPr wrap="square" rtlCol="0">
+              <a:spAutoFit/>
+            </a:bodyPr>
+            <a:lstStyle/>
+            <a:p>
+              <a:r>
+                <a:rPr lang="en-GB" sz="1600" dirty="0" smtClean="0"/>
+                <a:t>Microphone</a:t>
+              </a:r>
+              <a:endParaRPr lang="en-US" sz="1400" dirty="0"/>
+            </a:p>
+          </p:txBody>
+        </p:sp>
+        <p:sp>
+          <p:nvSpPr>
+            <p:cNvPr id="51" name="TextBox 50"/>
+            <p:cNvSpPr txBox="1"/>
+            <p:nvPr/>
+          </p:nvSpPr>
+          <p:spPr>
+            <a:xfrm>
+              <a:off x="4994577" y="2155204"/>
+              <a:ext cx="1738402" cy="338554"/>
+            </a:xfrm>
+            <a:prstGeom prst="rect">
+              <a:avLst/>
+            </a:prstGeom>
+            <a:noFill/>
+          </p:spPr>
+          <p:txBody>
+            <a:bodyPr wrap="square" rtlCol="0">
+              <a:spAutoFit/>
+            </a:bodyPr>
+            <a:lstStyle/>
+            <a:p>
+              <a:r>
+                <a:rPr lang="en-GB" sz="1600" dirty="0" smtClean="0"/>
+                <a:t>Active spots</a:t>
+              </a:r>
+              <a:endParaRPr lang="en-US" sz="1600" dirty="0"/>
+            </a:p>
+          </p:txBody>
+        </p:sp>
+        <p:sp>
+          <p:nvSpPr>
+            <p:cNvPr id="52" name="TextBox 51"/>
+            <p:cNvSpPr txBox="1"/>
+            <p:nvPr/>
+          </p:nvSpPr>
+          <p:spPr>
+            <a:xfrm>
+              <a:off x="4994182" y="2515244"/>
+              <a:ext cx="1738402" cy="338554"/>
+            </a:xfrm>
+            <a:prstGeom prst="rect">
+              <a:avLst/>
+            </a:prstGeom>
+            <a:noFill/>
+          </p:spPr>
+          <p:txBody>
+            <a:bodyPr wrap="square" rtlCol="0">
+              <a:spAutoFit/>
+            </a:bodyPr>
+            <a:lstStyle/>
+            <a:p>
+              <a:r>
+                <a:rPr lang="en-GB" sz="1600" dirty="0" smtClean="0"/>
+                <a:t>Surface edge</a:t>
+              </a:r>
+              <a:endParaRPr lang="en-US" sz="1600" dirty="0"/>
+            </a:p>
+          </p:txBody>
+        </p:sp>
+        <p:grpSp>
+          <p:nvGrpSpPr>
+            <p:cNvPr id="112" name="Group 111"/>
+            <p:cNvGrpSpPr/>
+            <p:nvPr/>
+          </p:nvGrpSpPr>
+          <p:grpSpPr>
+            <a:xfrm rot="10800000">
+              <a:off x="4683929" y="1501716"/>
+              <a:ext cx="332474" cy="200517"/>
+              <a:chOff x="475928" y="263467"/>
+              <a:chExt cx="711696" cy="429229"/>
+            </a:xfrm>
+          </p:grpSpPr>
+          <p:grpSp>
+            <p:nvGrpSpPr>
+              <p:cNvPr id="113" name="Group 112"/>
+              <p:cNvGrpSpPr/>
+              <p:nvPr/>
+            </p:nvGrpSpPr>
+            <p:grpSpPr>
+              <a:xfrm>
+                <a:off x="475928" y="404664"/>
+                <a:ext cx="711696" cy="288032"/>
+                <a:chOff x="475928" y="404664"/>
+                <a:chExt cx="711696" cy="288032"/>
+              </a:xfrm>
+            </p:grpSpPr>
+            <p:sp>
+              <p:nvSpPr>
+                <p:cNvPr id="115" name="Rectangle 114"/>
+                <p:cNvSpPr/>
+                <p:nvPr/>
+              </p:nvSpPr>
+              <p:spPr>
+                <a:xfrm>
+                  <a:off x="683568" y="404664"/>
+                  <a:ext cx="288032" cy="72008"/>
+                </a:xfrm>
+                <a:prstGeom prst="rect">
+                  <a:avLst/>
+                </a:prstGeom>
+                <a:noFill/>
+                <a:ln w="12700">
+                  <a:solidFill>
+                    <a:schemeClr val="tx1"/>
+                  </a:solidFill>
+                </a:ln>
+              </p:spPr>
+              <p:style>
+                <a:lnRef idx="2">
+                  <a:schemeClr val="accent1">
+                    <a:shade val="50000"/>
+                  </a:schemeClr>
+                </a:lnRef>
+                <a:fillRef idx="1">
+                  <a:schemeClr val="accent1"/>
+                </a:fillRef>
+                <a:effectRef idx="0">
+                  <a:schemeClr val="accent1"/>
+                </a:effectRef>
+                <a:fontRef idx="minor">
+                  <a:schemeClr val="lt1"/>
+                </a:fontRef>
+              </p:style>
+              <p:txBody>
+                <a:bodyPr rtlCol="0" anchor="ctr"/>
+                <a:lstStyle/>
+                <a:p>
+                  <a:pPr algn="ctr"/>
+                  <a:endParaRPr lang="en-US"/>
+                </a:p>
+              </p:txBody>
+            </p:sp>
+            <p:grpSp>
+              <p:nvGrpSpPr>
+                <p:cNvPr id="116" name="Group 115"/>
+                <p:cNvGrpSpPr/>
+                <p:nvPr/>
+              </p:nvGrpSpPr>
+              <p:grpSpPr>
+                <a:xfrm>
+                  <a:off x="475928" y="477914"/>
+                  <a:ext cx="711696" cy="214782"/>
+                  <a:chOff x="331912" y="477914"/>
+                  <a:chExt cx="999728" cy="237626"/>
+                </a:xfrm>
+              </p:grpSpPr>
+              <p:cxnSp>
+                <p:nvCxnSpPr>
+                  <p:cNvPr id="117" name="Straight Connector 116"/>
+                  <p:cNvCxnSpPr/>
+                  <p:nvPr/>
+                </p:nvCxnSpPr>
+                <p:spPr>
+                  <a:xfrm flipH="1">
+                    <a:off x="331912" y="477914"/>
+                    <a:ext cx="432048" cy="237626"/>
+                  </a:xfrm>
+                  <a:prstGeom prst="line">
+                    <a:avLst/>
+                  </a:prstGeom>
+                  <a:ln w="12700">
+                    <a:solidFill>
+                      <a:schemeClr val="tx1"/>
+                    </a:solidFill>
+                  </a:ln>
+                </p:spPr>
+                <p:style>
+                  <a:lnRef idx="1">
+                    <a:schemeClr val="accent1"/>
+                  </a:lnRef>
+                  <a:fillRef idx="0">
+                    <a:schemeClr val="accent1"/>
+                  </a:fillRef>
+                  <a:effectRef idx="0">
+                    <a:schemeClr val="accent1"/>
+                  </a:effectRef>
+                  <a:fontRef idx="minor">
+                    <a:schemeClr val="tx1"/>
+                  </a:fontRef>
+                </p:style>
+              </p:cxnSp>
+              <p:cxnSp>
+                <p:nvCxnSpPr>
+                  <p:cNvPr id="118" name="Straight Connector 117"/>
+                  <p:cNvCxnSpPr/>
+                  <p:nvPr/>
+                </p:nvCxnSpPr>
+                <p:spPr>
+                  <a:xfrm flipH="1" flipV="1">
+                    <a:off x="899592" y="477914"/>
+                    <a:ext cx="432048" cy="237626"/>
+                  </a:xfrm>
+                  <a:prstGeom prst="line">
+                    <a:avLst/>
+                  </a:prstGeom>
+                  <a:ln w="12700">
+                    <a:solidFill>
+                      <a:schemeClr val="tx1"/>
+                    </a:solidFill>
+                  </a:ln>
+                </p:spPr>
+                <p:style>
+                  <a:lnRef idx="1">
+                    <a:schemeClr val="accent1"/>
+                  </a:lnRef>
+                  <a:fillRef idx="0">
+                    <a:schemeClr val="accent1"/>
+                  </a:fillRef>
+                  <a:effectRef idx="0">
+                    <a:schemeClr val="accent1"/>
+                  </a:effectRef>
+                  <a:fontRef idx="minor">
+                    <a:schemeClr val="tx1"/>
+                  </a:fontRef>
+                </p:style>
+              </p:cxnSp>
+            </p:grpSp>
+          </p:grpSp>
+          <p:sp>
+            <p:nvSpPr>
+              <p:cNvPr id="114" name="Arc 113"/>
+              <p:cNvSpPr/>
+              <p:nvPr/>
+            </p:nvSpPr>
+            <p:spPr>
+              <a:xfrm rot="8007923">
+                <a:off x="683454" y="248227"/>
+                <a:ext cx="288032" cy="318512"/>
+              </a:xfrm>
+              <a:prstGeom prst="arc">
+                <a:avLst/>
+              </a:prstGeom>
+              <a:ln w="12700">
+                <a:solidFill>
+                  <a:schemeClr val="tx1"/>
+                </a:solidFill>
+              </a:ln>
+            </p:spPr>
+            <p:style>
+              <a:lnRef idx="1">
+                <a:schemeClr val="accent1"/>
+              </a:lnRef>
+              <a:fillRef idx="0">
+                <a:schemeClr val="accent1"/>
+              </a:fillRef>
+              <a:effectRef idx="0">
+                <a:schemeClr val="accent1"/>
+              </a:effectRef>
+              <a:fontRef idx="minor">
+                <a:schemeClr val="tx1"/>
+              </a:fontRef>
+            </p:style>
+            <p:txBody>
+              <a:bodyPr rtlCol="0" anchor="ctr"/>
+              <a:lstStyle/>
+              <a:p>
+                <a:pPr algn="ctr"/>
+                <a:endParaRPr lang="en-US"/>
+              </a:p>
+            </p:txBody>
+          </p:sp>
+        </p:grpSp>
+        <p:sp>
+          <p:nvSpPr>
+            <p:cNvPr id="119" name="TextBox 118"/>
+            <p:cNvSpPr txBox="1"/>
+            <p:nvPr/>
+          </p:nvSpPr>
+          <p:spPr>
+            <a:xfrm>
+              <a:off x="4994182" y="1393278"/>
+              <a:ext cx="1738400" cy="338554"/>
+            </a:xfrm>
+            <a:prstGeom prst="rect">
+              <a:avLst/>
+            </a:prstGeom>
+            <a:noFill/>
+          </p:spPr>
+          <p:txBody>
+            <a:bodyPr wrap="square" rtlCol="0">
+              <a:spAutoFit/>
+            </a:bodyPr>
+            <a:lstStyle/>
+            <a:p>
+              <a:r>
+                <a:rPr lang="en-GB" sz="1600" dirty="0" smtClean="0"/>
+                <a:t>Noise source</a:t>
+              </a:r>
+              <a:endParaRPr lang="en-US" sz="1400" dirty="0"/>
+            </a:p>
+          </p:txBody>
+        </p:sp>
       </p:grpSp>
     </p:spTree>
   </p:cSld>
   <p:clrMapOvr>
     <a:masterClrMapping/>
   </p:clrMapOvr>
+  <p:timing>
+    <p:tnLst>
+      <p:par>
+        <p:cTn id="1" dur="indefinite" restart="never" nodeType="tmRoot"/>
+      </p:par>
+    </p:tnLst>
+  </p:timing>
 </p:sld>
 </file>
 

</xml_diff>